<commit_message>
Slightly less rough version of presentation
</commit_message>
<xml_diff>
--- a/PST_2.pptx
+++ b/PST_2.pptx
@@ -5,10 +5,10 @@
     <p:sldMasterId id="2147483648" r:id="rId1"/>
   </p:sldMasterIdLst>
   <p:notesMasterIdLst>
-    <p:notesMasterId r:id="rId15"/>
+    <p:notesMasterId r:id="rId14"/>
   </p:notesMasterIdLst>
   <p:handoutMasterIdLst>
-    <p:handoutMasterId r:id="rId16"/>
+    <p:handoutMasterId r:id="rId15"/>
   </p:handoutMasterIdLst>
   <p:sldIdLst>
     <p:sldId id="258" r:id="rId2"/>
@@ -16,14 +16,13 @@
     <p:sldId id="265" r:id="rId4"/>
     <p:sldId id="263" r:id="rId5"/>
     <p:sldId id="266" r:id="rId6"/>
-    <p:sldId id="260" r:id="rId7"/>
-    <p:sldId id="268" r:id="rId8"/>
-    <p:sldId id="264" r:id="rId9"/>
-    <p:sldId id="269" r:id="rId10"/>
-    <p:sldId id="270" r:id="rId11"/>
-    <p:sldId id="273" r:id="rId12"/>
-    <p:sldId id="272" r:id="rId13"/>
-    <p:sldId id="271" r:id="rId14"/>
+    <p:sldId id="268" r:id="rId7"/>
+    <p:sldId id="260" r:id="rId8"/>
+    <p:sldId id="269" r:id="rId9"/>
+    <p:sldId id="270" r:id="rId10"/>
+    <p:sldId id="273" r:id="rId11"/>
+    <p:sldId id="272" r:id="rId12"/>
+    <p:sldId id="271" r:id="rId13"/>
   </p:sldIdLst>
   <p:sldSz cx="12192000" cy="6858000"/>
   <p:notesSz cx="6858000" cy="9144000"/>
@@ -902,9 +901,10 @@
         <a:lstStyle/>
         <a:p>
           <a:r>
-            <a:rPr lang="en-US" dirty="0"/>
-            <a:t>Step 1 Title</a:t>
+            <a:rPr lang="en-US" dirty="0" smtClean="0"/>
+            <a:t>Initialisation</a:t>
           </a:r>
+          <a:endParaRPr lang="en-US" dirty="0"/>
         </a:p>
       </dgm:t>
     </dgm:pt>
@@ -930,150 +930,6 @@
         </a:p>
       </dgm:t>
     </dgm:pt>
-    <dgm:pt modelId="{23A0DE4A-FE92-496E-B335-3433CEFB74E9}">
-      <dgm:prSet phldrT="[Text]"/>
-      <dgm:spPr/>
-      <dgm:t>
-        <a:bodyPr/>
-        <a:lstStyle/>
-        <a:p>
-          <a:r>
-            <a:rPr lang="en-US" dirty="0"/>
-            <a:t>Task description</a:t>
-          </a:r>
-        </a:p>
-      </dgm:t>
-    </dgm:pt>
-    <dgm:pt modelId="{68935D38-FEDC-4CD3-8002-43CB3944BEAF}" type="parTrans" cxnId="{67A03D8F-F327-4A9F-ABBC-1EB67EFD1ECB}">
-      <dgm:prSet/>
-      <dgm:spPr/>
-      <dgm:t>
-        <a:bodyPr/>
-        <a:lstStyle/>
-        <a:p>
-          <a:endParaRPr lang="en-US"/>
-        </a:p>
-      </dgm:t>
-    </dgm:pt>
-    <dgm:pt modelId="{55DF926D-029A-4E18-95C4-77A5A37CAE40}" type="sibTrans" cxnId="{67A03D8F-F327-4A9F-ABBC-1EB67EFD1ECB}">
-      <dgm:prSet/>
-      <dgm:spPr/>
-      <dgm:t>
-        <a:bodyPr/>
-        <a:lstStyle/>
-        <a:p>
-          <a:endParaRPr lang="en-US"/>
-        </a:p>
-      </dgm:t>
-    </dgm:pt>
-    <dgm:pt modelId="{97AFB725-9839-43BA-B026-0DD6AA03AD9C}">
-      <dgm:prSet phldrT="[Text]"/>
-      <dgm:spPr/>
-      <dgm:t>
-        <a:bodyPr/>
-        <a:lstStyle/>
-        <a:p>
-          <a:r>
-            <a:rPr lang="en-US" dirty="0"/>
-            <a:t>Task description</a:t>
-          </a:r>
-        </a:p>
-      </dgm:t>
-    </dgm:pt>
-    <dgm:pt modelId="{CC01022B-5039-457F-931E-79459E3C1DC4}" type="parTrans" cxnId="{97004F90-D1DB-4A84-A8AE-504DE1F07341}">
-      <dgm:prSet/>
-      <dgm:spPr/>
-      <dgm:t>
-        <a:bodyPr/>
-        <a:lstStyle/>
-        <a:p>
-          <a:endParaRPr lang="en-US"/>
-        </a:p>
-      </dgm:t>
-    </dgm:pt>
-    <dgm:pt modelId="{D5C26250-A06D-4B41-BC14-92648809C21F}" type="sibTrans" cxnId="{97004F90-D1DB-4A84-A8AE-504DE1F07341}">
-      <dgm:prSet/>
-      <dgm:spPr/>
-      <dgm:t>
-        <a:bodyPr/>
-        <a:lstStyle/>
-        <a:p>
-          <a:endParaRPr lang="en-US"/>
-        </a:p>
-      </dgm:t>
-    </dgm:pt>
-    <dgm:pt modelId="{B86124A4-14C7-49C7-A342-9B2C2B94980B}">
-      <dgm:prSet phldrT="[Text]"/>
-      <dgm:spPr/>
-      <dgm:t>
-        <a:bodyPr/>
-        <a:lstStyle/>
-        <a:p>
-          <a:r>
-            <a:rPr lang="en-US" dirty="0"/>
-            <a:t>Task description</a:t>
-          </a:r>
-        </a:p>
-      </dgm:t>
-    </dgm:pt>
-    <dgm:pt modelId="{B2F6F8FA-C3EE-485C-BFEC-A81570DC47D8}" type="parTrans" cxnId="{508A9F6A-C4F1-4147-A5F6-B89293B446E8}">
-      <dgm:prSet/>
-      <dgm:spPr/>
-      <dgm:t>
-        <a:bodyPr/>
-        <a:lstStyle/>
-        <a:p>
-          <a:endParaRPr lang="en-US"/>
-        </a:p>
-      </dgm:t>
-    </dgm:pt>
-    <dgm:pt modelId="{1114C752-8188-4E63-BFFC-E4081ACE9882}" type="sibTrans" cxnId="{508A9F6A-C4F1-4147-A5F6-B89293B446E8}">
-      <dgm:prSet/>
-      <dgm:spPr/>
-      <dgm:t>
-        <a:bodyPr/>
-        <a:lstStyle/>
-        <a:p>
-          <a:endParaRPr lang="en-US"/>
-        </a:p>
-      </dgm:t>
-    </dgm:pt>
-    <dgm:pt modelId="{A97FC57D-50D6-4D43-99C3-06D09820F122}">
-      <dgm:prSet phldrT="[Text]"/>
-      <dgm:spPr/>
-      <dgm:t>
-        <a:bodyPr/>
-        <a:lstStyle/>
-        <a:p>
-          <a:r>
-            <a:rPr lang="en-US" dirty="0"/>
-            <a:t>Task description</a:t>
-          </a:r>
-        </a:p>
-      </dgm:t>
-    </dgm:pt>
-    <dgm:pt modelId="{5DD877C7-E4D9-4A68-A305-5A7689D3DBE7}" type="parTrans" cxnId="{D286A548-6BB0-4DED-9FB5-D87042DDBE0A}">
-      <dgm:prSet/>
-      <dgm:spPr/>
-      <dgm:t>
-        <a:bodyPr/>
-        <a:lstStyle/>
-        <a:p>
-          <a:endParaRPr lang="en-US"/>
-        </a:p>
-      </dgm:t>
-    </dgm:pt>
-    <dgm:pt modelId="{C17BCABE-BEF2-4CC4-B037-B6B4866665CD}" type="sibTrans" cxnId="{D286A548-6BB0-4DED-9FB5-D87042DDBE0A}">
-      <dgm:prSet/>
-      <dgm:spPr/>
-      <dgm:t>
-        <a:bodyPr/>
-        <a:lstStyle/>
-        <a:p>
-          <a:endParaRPr lang="en-US"/>
-        </a:p>
-      </dgm:t>
-    </dgm:pt>
     <dgm:pt modelId="{B6E26FFC-9977-4BBC-BEC7-3D6B63754E52}">
       <dgm:prSet phldrT="[Text]"/>
       <dgm:spPr/>
@@ -1082,9 +938,10 @@
         <a:lstStyle/>
         <a:p>
           <a:r>
-            <a:rPr lang="en-US" dirty="0"/>
-            <a:t>Step 2 Title</a:t>
+            <a:rPr lang="en-US" dirty="0" smtClean="0"/>
+            <a:t>Traversal</a:t>
           </a:r>
+          <a:endParaRPr lang="en-US" dirty="0"/>
         </a:p>
       </dgm:t>
     </dgm:pt>
@@ -1118,9 +975,10 @@
         <a:lstStyle/>
         <a:p>
           <a:r>
-            <a:rPr lang="en-US" dirty="0"/>
-            <a:t>Task description</a:t>
+            <a:rPr lang="en-US" dirty="0" smtClean="0"/>
+            <a:t>Depth-first search</a:t>
           </a:r>
+          <a:endParaRPr lang="en-US" dirty="0"/>
         </a:p>
       </dgm:t>
     </dgm:pt>
@@ -1154,9 +1012,10 @@
         <a:lstStyle/>
         <a:p>
           <a:r>
-            <a:rPr lang="en-US" dirty="0"/>
-            <a:t>Task description</a:t>
+            <a:rPr lang="en-US" dirty="0" smtClean="0"/>
+            <a:t>Warnsdorff’s Rule</a:t>
           </a:r>
+          <a:endParaRPr lang="en-US" dirty="0"/>
         </a:p>
       </dgm:t>
     </dgm:pt>
@@ -1190,9 +1049,10 @@
         <a:lstStyle/>
         <a:p>
           <a:r>
-            <a:rPr lang="en-US" dirty="0"/>
-            <a:t>Task description</a:t>
+            <a:rPr lang="en-US" dirty="0" smtClean="0"/>
+            <a:t>Black magic/sacrificing virgins</a:t>
           </a:r>
+          <a:endParaRPr lang="en-US" dirty="0"/>
         </a:p>
       </dgm:t>
     </dgm:pt>
@@ -1226,9 +1086,10 @@
         <a:lstStyle/>
         <a:p>
           <a:r>
-            <a:rPr lang="en-US" dirty="0"/>
-            <a:t>Step 3 Title</a:t>
+            <a:rPr lang="en-US" dirty="0" smtClean="0"/>
+            <a:t>Re-evaluation</a:t>
           </a:r>
+          <a:endParaRPr lang="en-US" dirty="0"/>
         </a:p>
       </dgm:t>
     </dgm:pt>
@@ -1262,9 +1123,10 @@
         <a:lstStyle/>
         <a:p>
           <a:r>
-            <a:rPr lang="en-US" dirty="0"/>
-            <a:t>Task description</a:t>
+            <a:rPr lang="en-US" dirty="0" smtClean="0"/>
+            <a:t>Backtracking when hitting a dead end</a:t>
           </a:r>
+          <a:endParaRPr lang="en-US" dirty="0"/>
         </a:p>
       </dgm:t>
     </dgm:pt>
@@ -1290,42 +1152,6 @@
         </a:p>
       </dgm:t>
     </dgm:pt>
-    <dgm:pt modelId="{357008B7-F3FD-489F-A410-81C9A9EFE4DA}">
-      <dgm:prSet phldrT="[Text]"/>
-      <dgm:spPr/>
-      <dgm:t>
-        <a:bodyPr/>
-        <a:lstStyle/>
-        <a:p>
-          <a:r>
-            <a:rPr lang="en-US" dirty="0"/>
-            <a:t>Task description</a:t>
-          </a:r>
-        </a:p>
-      </dgm:t>
-    </dgm:pt>
-    <dgm:pt modelId="{ED5EFE54-4C6D-4A88-939B-CE66C6668425}" type="parTrans" cxnId="{8910F93B-7180-4A52-9856-879D102D33F8}">
-      <dgm:prSet/>
-      <dgm:spPr/>
-      <dgm:t>
-        <a:bodyPr/>
-        <a:lstStyle/>
-        <a:p>
-          <a:endParaRPr lang="en-US"/>
-        </a:p>
-      </dgm:t>
-    </dgm:pt>
-    <dgm:pt modelId="{87BC108C-4915-4A4B-8565-E4BD28BA3C35}" type="sibTrans" cxnId="{8910F93B-7180-4A52-9856-879D102D33F8}">
-      <dgm:prSet/>
-      <dgm:spPr/>
-      <dgm:t>
-        <a:bodyPr/>
-        <a:lstStyle/>
-        <a:p>
-          <a:endParaRPr lang="en-US"/>
-        </a:p>
-      </dgm:t>
-    </dgm:pt>
     <dgm:pt modelId="{E5E95E82-EF79-43CA-AA86-43B0E1CBCD3F}">
       <dgm:prSet phldrT="[Text]"/>
       <dgm:spPr/>
@@ -1334,9 +1160,10 @@
         <a:lstStyle/>
         <a:p>
           <a:r>
-            <a:rPr lang="en-US" dirty="0"/>
-            <a:t>Step 4 Title</a:t>
+            <a:rPr lang="en-US" dirty="0" smtClean="0"/>
+            <a:t>Completion</a:t>
           </a:r>
+          <a:endParaRPr lang="en-US" dirty="0"/>
         </a:p>
       </dgm:t>
     </dgm:pt>
@@ -1370,9 +1197,10 @@
         <a:lstStyle/>
         <a:p>
           <a:r>
-            <a:rPr lang="en-US" dirty="0"/>
-            <a:t>Task description</a:t>
+            <a:rPr lang="en-US" dirty="0" smtClean="0"/>
+            <a:t>Solved tour</a:t>
           </a:r>
+          <a:endParaRPr lang="en-US" dirty="0"/>
         </a:p>
       </dgm:t>
     </dgm:pt>
@@ -1406,9 +1234,10 @@
         <a:lstStyle/>
         <a:p>
           <a:r>
-            <a:rPr lang="en-US" dirty="0"/>
-            <a:t>Task description</a:t>
+            <a:rPr lang="en-US" dirty="0" smtClean="0"/>
+            <a:t>Printing finished board with moves taken</a:t>
           </a:r>
+          <a:endParaRPr lang="en-US" dirty="0"/>
         </a:p>
       </dgm:t>
     </dgm:pt>
@@ -1424,6 +1253,117 @@
       </dgm:t>
     </dgm:pt>
     <dgm:pt modelId="{118572A4-3B5E-487E-8015-6A319369077F}" type="sibTrans" cxnId="{1C5CE732-A00F-4C06-A1A8-B209BC6B496D}">
+      <dgm:prSet/>
+      <dgm:spPr/>
+      <dgm:t>
+        <a:bodyPr/>
+        <a:lstStyle/>
+        <a:p>
+          <a:endParaRPr lang="en-US"/>
+        </a:p>
+      </dgm:t>
+    </dgm:pt>
+    <dgm:pt modelId="{23A0DE4A-FE92-496E-B335-3433CEFB74E9}">
+      <dgm:prSet phldrT="[Text]"/>
+      <dgm:spPr/>
+      <dgm:t>
+        <a:bodyPr/>
+        <a:lstStyle/>
+        <a:p>
+          <a:r>
+            <a:rPr lang="en-US" dirty="0" smtClean="0"/>
+            <a:t>Create board</a:t>
+          </a:r>
+          <a:endParaRPr lang="en-US" dirty="0"/>
+        </a:p>
+      </dgm:t>
+    </dgm:pt>
+    <dgm:pt modelId="{55DF926D-029A-4E18-95C4-77A5A37CAE40}" type="sibTrans" cxnId="{67A03D8F-F327-4A9F-ABBC-1EB67EFD1ECB}">
+      <dgm:prSet/>
+      <dgm:spPr/>
+      <dgm:t>
+        <a:bodyPr/>
+        <a:lstStyle/>
+        <a:p>
+          <a:endParaRPr lang="en-US"/>
+        </a:p>
+      </dgm:t>
+    </dgm:pt>
+    <dgm:pt modelId="{68935D38-FEDC-4CD3-8002-43CB3944BEAF}" type="parTrans" cxnId="{67A03D8F-F327-4A9F-ABBC-1EB67EFD1ECB}">
+      <dgm:prSet/>
+      <dgm:spPr/>
+      <dgm:t>
+        <a:bodyPr/>
+        <a:lstStyle/>
+        <a:p>
+          <a:endParaRPr lang="en-US"/>
+        </a:p>
+      </dgm:t>
+    </dgm:pt>
+    <dgm:pt modelId="{97AFB725-9839-43BA-B026-0DD6AA03AD9C}">
+      <dgm:prSet phldrT="[Text]"/>
+      <dgm:spPr/>
+      <dgm:t>
+        <a:bodyPr/>
+        <a:lstStyle/>
+        <a:p>
+          <a:r>
+            <a:rPr lang="en-US" dirty="0" smtClean="0"/>
+            <a:t>Rules for movement</a:t>
+          </a:r>
+          <a:endParaRPr lang="en-US" dirty="0"/>
+        </a:p>
+      </dgm:t>
+    </dgm:pt>
+    <dgm:pt modelId="{D5C26250-A06D-4B41-BC14-92648809C21F}" type="sibTrans" cxnId="{97004F90-D1DB-4A84-A8AE-504DE1F07341}">
+      <dgm:prSet/>
+      <dgm:spPr/>
+      <dgm:t>
+        <a:bodyPr/>
+        <a:lstStyle/>
+        <a:p>
+          <a:endParaRPr lang="en-US"/>
+        </a:p>
+      </dgm:t>
+    </dgm:pt>
+    <dgm:pt modelId="{CC01022B-5039-457F-931E-79459E3C1DC4}" type="parTrans" cxnId="{97004F90-D1DB-4A84-A8AE-504DE1F07341}">
+      <dgm:prSet/>
+      <dgm:spPr/>
+      <dgm:t>
+        <a:bodyPr/>
+        <a:lstStyle/>
+        <a:p>
+          <a:endParaRPr lang="en-US"/>
+        </a:p>
+      </dgm:t>
+    </dgm:pt>
+    <dgm:pt modelId="{E2D04747-C7EB-45CB-A968-DF0127DA9F0B}">
+      <dgm:prSet phldrT="[Text]"/>
+      <dgm:spPr/>
+      <dgm:t>
+        <a:bodyPr/>
+        <a:lstStyle/>
+        <a:p>
+          <a:r>
+            <a:rPr lang="en-US" dirty="0" smtClean="0"/>
+            <a:t>Continuing a new path</a:t>
+          </a:r>
+          <a:endParaRPr lang="en-US" dirty="0"/>
+        </a:p>
+      </dgm:t>
+    </dgm:pt>
+    <dgm:pt modelId="{89C8DD1A-55B9-4637-BFBB-622E7F33EBA5}" type="parTrans" cxnId="{632C7C22-F090-4A5D-82EA-1C9023ED34BD}">
+      <dgm:prSet/>
+      <dgm:spPr/>
+      <dgm:t>
+        <a:bodyPr/>
+        <a:lstStyle/>
+        <a:p>
+          <a:endParaRPr lang="en-US"/>
+        </a:p>
+      </dgm:t>
+    </dgm:pt>
+    <dgm:pt modelId="{97E8E710-5821-45E1-B399-BC178BD47183}" type="sibTrans" cxnId="{632C7C22-F090-4A5D-82EA-1C9023ED34BD}">
       <dgm:prSet/>
       <dgm:spPr/>
       <dgm:t>
@@ -1451,7 +1391,7 @@
       </dgm:t>
     </dgm:pt>
     <dgm:pt modelId="{98302F07-D6A9-46A5-9807-EBF6C9F5B2DD}" type="pres">
-      <dgm:prSet presAssocID="{082E8A29-955A-4C7C-A174-3E9DCD4DC89B}" presName="node" presStyleLbl="node1" presStyleIdx="0" presStyleCnt="4">
+      <dgm:prSet presAssocID="{082E8A29-955A-4C7C-A174-3E9DCD4DC89B}" presName="node" presStyleLbl="node1" presStyleIdx="0" presStyleCnt="4" custLinFactX="-3812" custLinFactNeighborX="-100000">
         <dgm:presLayoutVars>
           <dgm:bulletEnabled val="1"/>
         </dgm:presLayoutVars>
@@ -1524,9 +1464,7 @@
     </dgm:pt>
   </dgm:ptLst>
   <dgm:cxnLst>
-    <dgm:cxn modelId="{1B9593D8-0118-451B-8B48-CC6C91B73C1B}" type="presOf" srcId="{B86124A4-14C7-49C7-A342-9B2C2B94980B}" destId="{98302F07-D6A9-46A5-9807-EBF6C9F5B2DD}" srcOrd="0" destOrd="3" presId="urn:microsoft.com/office/officeart/2005/8/layout/hList6"/>
     <dgm:cxn modelId="{1B8E71B0-2D3A-4AB0-8843-CFDACEDC3198}" srcId="{6D0E5D9F-7263-4526-A227-51301233F549}" destId="{F3256203-D9D1-492A-B801-68C1A32486F0}" srcOrd="0" destOrd="0" parTransId="{E9A20291-2E30-4C14-BB7D-DC095A20ECB6}" sibTransId="{6C9440D0-8847-40C0-98BC-2B5EA5745C3A}"/>
-    <dgm:cxn modelId="{508A9F6A-C4F1-4147-A5F6-B89293B446E8}" srcId="{082E8A29-955A-4C7C-A174-3E9DCD4DC89B}" destId="{B86124A4-14C7-49C7-A342-9B2C2B94980B}" srcOrd="2" destOrd="0" parTransId="{B2F6F8FA-C3EE-485C-BFEC-A81570DC47D8}" sibTransId="{1114C752-8188-4E63-BFFC-E4081ACE9882}"/>
     <dgm:cxn modelId="{F89EA6DF-D106-435E-9337-D23286A767A6}" srcId="{B6E26FFC-9977-4BBC-BEC7-3D6B63754E52}" destId="{44B2544A-D122-4B95-A36C-B03D9E272B48}" srcOrd="2" destOrd="0" parTransId="{9EE40E78-C1B8-4A87-A668-53AD816CED24}" sibTransId="{F32DECE0-DC7F-4DCF-A10D-96A117A49197}"/>
     <dgm:cxn modelId="{3B50A2DD-8777-42C9-93E1-40A37E404C87}" type="presOf" srcId="{44B2544A-D122-4B95-A36C-B03D9E272B48}" destId="{DAD9059A-916A-4916-A2A8-B42491568DD3}" srcOrd="0" destOrd="3" presId="urn:microsoft.com/office/officeart/2005/8/layout/hList6"/>
     <dgm:cxn modelId="{C8C462C6-33A3-4E8B-91FE-36DBE92F1C4A}" srcId="{CF9055CF-8DEB-4A02-949A-DE72B6AC5D37}" destId="{6D0E5D9F-7263-4526-A227-51301233F549}" srcOrd="2" destOrd="0" parTransId="{23416D07-25F8-426C-BC65-639E6BCF4D6D}" sibTransId="{DE289E29-1989-4D8E-8AA6-F030105B3F13}"/>
@@ -1537,21 +1475,19 @@
     <dgm:cxn modelId="{2FA258D4-5B38-426D-B0D7-CD8F217A1137}" type="presOf" srcId="{E5E95E82-EF79-43CA-AA86-43B0E1CBCD3F}" destId="{86146B22-5360-4D1B-AC91-3378F10134EE}" srcOrd="0" destOrd="0" presId="urn:microsoft.com/office/officeart/2005/8/layout/hList6"/>
     <dgm:cxn modelId="{F4F3BD4C-7DE7-449F-8ECF-B43B2B86F2EB}" type="presOf" srcId="{CBCC21F5-552F-4D39-812E-6FCD4A366F58}" destId="{DAD9059A-916A-4916-A2A8-B42491568DD3}" srcOrd="0" destOrd="1" presId="urn:microsoft.com/office/officeart/2005/8/layout/hList6"/>
     <dgm:cxn modelId="{67A03D8F-F327-4A9F-ABBC-1EB67EFD1ECB}" srcId="{082E8A29-955A-4C7C-A174-3E9DCD4DC89B}" destId="{23A0DE4A-FE92-496E-B335-3433CEFB74E9}" srcOrd="0" destOrd="0" parTransId="{68935D38-FEDC-4CD3-8002-43CB3944BEAF}" sibTransId="{55DF926D-029A-4E18-95C4-77A5A37CAE40}"/>
-    <dgm:cxn modelId="{ECB535CD-5106-41E2-A5E6-D382C3792033}" type="presOf" srcId="{357008B7-F3FD-489F-A410-81C9A9EFE4DA}" destId="{25A33852-3C4B-4406-8856-3A4D6201948C}" srcOrd="0" destOrd="2" presId="urn:microsoft.com/office/officeart/2005/8/layout/hList6"/>
-    <dgm:cxn modelId="{AB981D0D-0AD5-4DD6-BA19-D4E75ECF1C7D}" type="presOf" srcId="{A97FC57D-50D6-4D43-99C3-06D09820F122}" destId="{98302F07-D6A9-46A5-9807-EBF6C9F5B2DD}" srcOrd="0" destOrd="4" presId="urn:microsoft.com/office/officeart/2005/8/layout/hList6"/>
     <dgm:cxn modelId="{2986897A-7787-444F-B6C8-41F3823EF3C1}" srcId="{CF9055CF-8DEB-4A02-949A-DE72B6AC5D37}" destId="{082E8A29-955A-4C7C-A174-3E9DCD4DC89B}" srcOrd="0" destOrd="0" parTransId="{BA7938E6-8DFA-40B7-B4C4-EACC6D85FC31}" sibTransId="{C2176686-D23E-48EB-9D1B-1A1B46236638}"/>
     <dgm:cxn modelId="{5351B217-259B-4E6A-85F5-2E408BEB0764}" type="presOf" srcId="{082E8A29-955A-4C7C-A174-3E9DCD4DC89B}" destId="{98302F07-D6A9-46A5-9807-EBF6C9F5B2DD}" srcOrd="0" destOrd="0" presId="urn:microsoft.com/office/officeart/2005/8/layout/hList6"/>
     <dgm:cxn modelId="{9CB4B27D-95A7-458D-A9CA-7754788DD095}" type="presOf" srcId="{62831651-7C26-466C-BAA4-31EA8D14E47A}" destId="{DAD9059A-916A-4916-A2A8-B42491568DD3}" srcOrd="0" destOrd="2" presId="urn:microsoft.com/office/officeart/2005/8/layout/hList6"/>
     <dgm:cxn modelId="{0676BA07-1135-49D0-993A-27A9F99FC0CD}" type="presOf" srcId="{B6E26FFC-9977-4BBC-BEC7-3D6B63754E52}" destId="{DAD9059A-916A-4916-A2A8-B42491568DD3}" srcOrd="0" destOrd="0" presId="urn:microsoft.com/office/officeart/2005/8/layout/hList6"/>
-    <dgm:cxn modelId="{D286A548-6BB0-4DED-9FB5-D87042DDBE0A}" srcId="{082E8A29-955A-4C7C-A174-3E9DCD4DC89B}" destId="{A97FC57D-50D6-4D43-99C3-06D09820F122}" srcOrd="3" destOrd="0" parTransId="{5DD877C7-E4D9-4A68-A305-5A7689D3DBE7}" sibTransId="{C17BCABE-BEF2-4CC4-B037-B6B4866665CD}"/>
     <dgm:cxn modelId="{DC53BA63-76BA-413A-ACCE-B7609C3FDC8E}" type="presOf" srcId="{A81358E0-3DE7-41AD-A28C-ABB22548B1F6}" destId="{86146B22-5360-4D1B-AC91-3378F10134EE}" srcOrd="0" destOrd="1" presId="urn:microsoft.com/office/officeart/2005/8/layout/hList6"/>
     <dgm:cxn modelId="{C06DA1C3-D38F-43B1-B24E-E80592CC29EC}" type="presOf" srcId="{23A0DE4A-FE92-496E-B335-3433CEFB74E9}" destId="{98302F07-D6A9-46A5-9807-EBF6C9F5B2DD}" srcOrd="0" destOrd="1" presId="urn:microsoft.com/office/officeart/2005/8/layout/hList6"/>
     <dgm:cxn modelId="{24179AE2-AA7E-4702-A358-E95F80152CCA}" type="presOf" srcId="{CF9055CF-8DEB-4A02-949A-DE72B6AC5D37}" destId="{6F1872F4-A030-4D64-A17C-72EA1ABBD62E}" srcOrd="0" destOrd="0" presId="urn:microsoft.com/office/officeart/2005/8/layout/hList6"/>
     <dgm:cxn modelId="{729DA21F-0A99-4CC3-ACFF-2A00EDCAA358}" type="presOf" srcId="{37A7C994-CC74-44DD-8777-ED6736B35821}" destId="{86146B22-5360-4D1B-AC91-3378F10134EE}" srcOrd="0" destOrd="2" presId="urn:microsoft.com/office/officeart/2005/8/layout/hList6"/>
     <dgm:cxn modelId="{97004F90-D1DB-4A84-A8AE-504DE1F07341}" srcId="{082E8A29-955A-4C7C-A174-3E9DCD4DC89B}" destId="{97AFB725-9839-43BA-B026-0DD6AA03AD9C}" srcOrd="1" destOrd="0" parTransId="{CC01022B-5039-457F-931E-79459E3C1DC4}" sibTransId="{D5C26250-A06D-4B41-BC14-92648809C21F}"/>
     <dgm:cxn modelId="{17E73148-9C08-4999-B21E-F3C5A0E3FC0C}" srcId="{CF9055CF-8DEB-4A02-949A-DE72B6AC5D37}" destId="{B6E26FFC-9977-4BBC-BEC7-3D6B63754E52}" srcOrd="1" destOrd="0" parTransId="{5CEFBD89-2F4F-4B51-A98A-0F3C86494166}" sibTransId="{48634C00-2335-4923-9072-EB7482323D9C}"/>
+    <dgm:cxn modelId="{632C7C22-F090-4A5D-82EA-1C9023ED34BD}" srcId="{6D0E5D9F-7263-4526-A227-51301233F549}" destId="{E2D04747-C7EB-45CB-A968-DF0127DA9F0B}" srcOrd="1" destOrd="0" parTransId="{89C8DD1A-55B9-4637-BFBB-622E7F33EBA5}" sibTransId="{97E8E710-5821-45E1-B399-BC178BD47183}"/>
+    <dgm:cxn modelId="{48249AA8-082D-492E-8225-733FD2000F3A}" type="presOf" srcId="{E2D04747-C7EB-45CB-A968-DF0127DA9F0B}" destId="{25A33852-3C4B-4406-8856-3A4D6201948C}" srcOrd="0" destOrd="2" presId="urn:microsoft.com/office/officeart/2005/8/layout/hList6"/>
     <dgm:cxn modelId="{1C5CE732-A00F-4C06-A1A8-B209BC6B496D}" srcId="{E5E95E82-EF79-43CA-AA86-43B0E1CBCD3F}" destId="{37A7C994-CC74-44DD-8777-ED6736B35821}" srcOrd="1" destOrd="0" parTransId="{03F017E7-7E3C-4E2C-9CEF-B07099F38801}" sibTransId="{118572A4-3B5E-487E-8015-6A319369077F}"/>
-    <dgm:cxn modelId="{8910F93B-7180-4A52-9856-879D102D33F8}" srcId="{6D0E5D9F-7263-4526-A227-51301233F549}" destId="{357008B7-F3FD-489F-A410-81C9A9EFE4DA}" srcOrd="1" destOrd="0" parTransId="{ED5EFE54-4C6D-4A88-939B-CE66C6668425}" sibTransId="{87BC108C-4915-4A4B-8565-E4BD28BA3C35}"/>
     <dgm:cxn modelId="{3C41F2E0-4620-40B4-9857-68872B278EFB}" srcId="{B6E26FFC-9977-4BBC-BEC7-3D6B63754E52}" destId="{CBCC21F5-552F-4D39-812E-6FCD4A366F58}" srcOrd="0" destOrd="0" parTransId="{4A973A1C-85F1-4969-A536-D29940229E2C}" sibTransId="{3640B940-6901-481F-ADF7-6B77DEEED764}"/>
     <dgm:cxn modelId="{77BD0D2D-7C4E-49B3-9A72-0FD33F32D294}" type="presOf" srcId="{6D0E5D9F-7263-4526-A227-51301233F549}" destId="{25A33852-3C4B-4406-8856-3A4D6201948C}" srcOrd="0" destOrd="0" presId="urn:microsoft.com/office/officeart/2005/8/layout/hList6"/>
     <dgm:cxn modelId="{3AE2742D-7673-4553-BCDD-292AE3B4BC50}" type="presOf" srcId="{97AFB725-9839-43BA-B026-0DD6AA03AD9C}" destId="{98302F07-D6A9-46A5-9807-EBF6C9F5B2DD}" srcOrd="0" destOrd="2" presId="urn:microsoft.com/office/officeart/2005/8/layout/hList6"/>
@@ -1588,7 +1524,7 @@
       </dsp:nvSpPr>
       <dsp:spPr>
         <a:xfrm rot="16200000">
-          <a:off x="-851716" y="854037"/>
+          <a:off x="-854037" y="854037"/>
           <a:ext cx="3986213" cy="2278137"/>
         </a:xfrm>
         <a:prstGeom prst="flowChartManualOperation">
@@ -1659,12 +1595,12 @@
         </a:fontRef>
       </dsp:style>
       <dsp:txBody>
-        <a:bodyPr spcFirstLastPara="0" vert="horz" wrap="square" lIns="165100" tIns="0" rIns="162719" bIns="0" numCol="1" spcCol="1270" anchor="t" anchorCtr="0">
+        <a:bodyPr spcFirstLastPara="0" vert="horz" wrap="square" lIns="152400" tIns="0" rIns="153073" bIns="0" numCol="1" spcCol="1270" anchor="t" anchorCtr="0">
           <a:noAutofit/>
         </a:bodyPr>
         <a:lstStyle/>
         <a:p>
-          <a:pPr lvl="0" algn="l" defTabSz="1155700">
+          <a:pPr lvl="0" algn="l" defTabSz="1066800">
             <a:lnSpc>
               <a:spcPct val="90000"/>
             </a:lnSpc>
@@ -1676,12 +1612,13 @@
             </a:spcAft>
           </a:pPr>
           <a:r>
-            <a:rPr lang="en-US" sz="2600" kern="1200" dirty="0"/>
-            <a:t>Step 1 Title</a:t>
+            <a:rPr lang="en-US" sz="2400" kern="1200" dirty="0" smtClean="0"/>
+            <a:t>Initialisation</a:t>
           </a:r>
+          <a:endParaRPr lang="en-US" sz="2400" kern="1200" dirty="0"/>
         </a:p>
         <a:p>
-          <a:pPr marL="228600" lvl="1" indent="-228600" algn="l" defTabSz="889000">
+          <a:pPr marL="171450" lvl="1" indent="-171450" algn="l" defTabSz="844550">
             <a:lnSpc>
               <a:spcPct val="90000"/>
             </a:lnSpc>
@@ -1694,12 +1631,13 @@
             <a:buChar char="••"/>
           </a:pPr>
           <a:r>
-            <a:rPr lang="en-US" sz="2000" kern="1200" dirty="0"/>
-            <a:t>Task description</a:t>
+            <a:rPr lang="en-US" sz="1900" kern="1200" dirty="0" smtClean="0"/>
+            <a:t>Create board</a:t>
           </a:r>
+          <a:endParaRPr lang="en-US" sz="1900" kern="1200" dirty="0"/>
         </a:p>
         <a:p>
-          <a:pPr marL="228600" lvl="1" indent="-228600" algn="l" defTabSz="889000">
+          <a:pPr marL="171450" lvl="1" indent="-171450" algn="l" defTabSz="844550">
             <a:lnSpc>
               <a:spcPct val="90000"/>
             </a:lnSpc>
@@ -1712,49 +1650,14 @@
             <a:buChar char="••"/>
           </a:pPr>
           <a:r>
-            <a:rPr lang="en-US" sz="2000" kern="1200" dirty="0"/>
-            <a:t>Task description</a:t>
+            <a:rPr lang="en-US" sz="1900" kern="1200" dirty="0" smtClean="0"/>
+            <a:t>Rules for movement</a:t>
           </a:r>
-        </a:p>
-        <a:p>
-          <a:pPr marL="228600" lvl="1" indent="-228600" algn="l" defTabSz="889000">
-            <a:lnSpc>
-              <a:spcPct val="90000"/>
-            </a:lnSpc>
-            <a:spcBef>
-              <a:spcPct val="0"/>
-            </a:spcBef>
-            <a:spcAft>
-              <a:spcPct val="15000"/>
-            </a:spcAft>
-            <a:buChar char="••"/>
-          </a:pPr>
-          <a:r>
-            <a:rPr lang="en-US" sz="2000" kern="1200" dirty="0"/>
-            <a:t>Task description</a:t>
-          </a:r>
-        </a:p>
-        <a:p>
-          <a:pPr marL="228600" lvl="1" indent="-228600" algn="l" defTabSz="889000">
-            <a:lnSpc>
-              <a:spcPct val="90000"/>
-            </a:lnSpc>
-            <a:spcBef>
-              <a:spcPct val="0"/>
-            </a:spcBef>
-            <a:spcAft>
-              <a:spcPct val="15000"/>
-            </a:spcAft>
-            <a:buChar char="••"/>
-          </a:pPr>
-          <a:r>
-            <a:rPr lang="en-US" sz="2000" kern="1200" dirty="0"/>
-            <a:t>Task description</a:t>
-          </a:r>
+          <a:endParaRPr lang="en-US" sz="1900" kern="1200" dirty="0"/>
         </a:p>
       </dsp:txBody>
       <dsp:txXfrm rot="5400000">
-        <a:off x="2322" y="797242"/>
+        <a:off x="1" y="797242"/>
         <a:ext cx="2278137" cy="2391727"/>
       </dsp:txXfrm>
     </dsp:sp>
@@ -1836,12 +1739,12 @@
         </a:fontRef>
       </dsp:style>
       <dsp:txBody>
-        <a:bodyPr spcFirstLastPara="0" vert="horz" wrap="square" lIns="165100" tIns="0" rIns="162719" bIns="0" numCol="1" spcCol="1270" anchor="t" anchorCtr="0">
+        <a:bodyPr spcFirstLastPara="0" vert="horz" wrap="square" lIns="152400" tIns="0" rIns="153073" bIns="0" numCol="1" spcCol="1270" anchor="t" anchorCtr="0">
           <a:noAutofit/>
         </a:bodyPr>
         <a:lstStyle/>
         <a:p>
-          <a:pPr lvl="0" algn="l" defTabSz="1155700">
+          <a:pPr lvl="0" algn="l" defTabSz="1066800">
             <a:lnSpc>
               <a:spcPct val="90000"/>
             </a:lnSpc>
@@ -1853,12 +1756,13 @@
             </a:spcAft>
           </a:pPr>
           <a:r>
-            <a:rPr lang="en-US" sz="2600" kern="1200" dirty="0"/>
-            <a:t>Step 2 Title</a:t>
+            <a:rPr lang="en-US" sz="2400" kern="1200" dirty="0" smtClean="0"/>
+            <a:t>Traversal</a:t>
           </a:r>
+          <a:endParaRPr lang="en-US" sz="2400" kern="1200" dirty="0"/>
         </a:p>
         <a:p>
-          <a:pPr marL="228600" lvl="1" indent="-228600" algn="l" defTabSz="889000">
+          <a:pPr marL="171450" lvl="1" indent="-171450" algn="l" defTabSz="844550">
             <a:lnSpc>
               <a:spcPct val="90000"/>
             </a:lnSpc>
@@ -1871,12 +1775,13 @@
             <a:buChar char="••"/>
           </a:pPr>
           <a:r>
-            <a:rPr lang="en-US" sz="2000" kern="1200" dirty="0"/>
-            <a:t>Task description</a:t>
+            <a:rPr lang="en-US" sz="1900" kern="1200" dirty="0" smtClean="0"/>
+            <a:t>Depth-first search</a:t>
           </a:r>
+          <a:endParaRPr lang="en-US" sz="1900" kern="1200" dirty="0"/>
         </a:p>
         <a:p>
-          <a:pPr marL="228600" lvl="1" indent="-228600" algn="l" defTabSz="889000">
+          <a:pPr marL="171450" lvl="1" indent="-171450" algn="l" defTabSz="844550">
             <a:lnSpc>
               <a:spcPct val="90000"/>
             </a:lnSpc>
@@ -1889,12 +1794,13 @@
             <a:buChar char="••"/>
           </a:pPr>
           <a:r>
-            <a:rPr lang="en-US" sz="2000" kern="1200" dirty="0"/>
-            <a:t>Task description</a:t>
+            <a:rPr lang="en-US" sz="1900" kern="1200" dirty="0" smtClean="0"/>
+            <a:t>Warnsdorff’s Rule</a:t>
           </a:r>
+          <a:endParaRPr lang="en-US" sz="1900" kern="1200" dirty="0"/>
         </a:p>
         <a:p>
-          <a:pPr marL="228600" lvl="1" indent="-228600" algn="l" defTabSz="889000">
+          <a:pPr marL="171450" lvl="1" indent="-171450" algn="l" defTabSz="844550">
             <a:lnSpc>
               <a:spcPct val="90000"/>
             </a:lnSpc>
@@ -1907,9 +1813,10 @@
             <a:buChar char="••"/>
           </a:pPr>
           <a:r>
-            <a:rPr lang="en-US" sz="2000" kern="1200" dirty="0"/>
-            <a:t>Task description</a:t>
+            <a:rPr lang="en-US" sz="1900" kern="1200" dirty="0" smtClean="0"/>
+            <a:t>Black magic/sacrificing virgins</a:t>
           </a:r>
+          <a:endParaRPr lang="en-US" sz="1900" kern="1200" dirty="0"/>
         </a:p>
       </dsp:txBody>
       <dsp:txXfrm rot="5400000">
@@ -1995,12 +1902,12 @@
         </a:fontRef>
       </dsp:style>
       <dsp:txBody>
-        <a:bodyPr spcFirstLastPara="0" vert="horz" wrap="square" lIns="165100" tIns="0" rIns="162719" bIns="0" numCol="1" spcCol="1270" anchor="t" anchorCtr="0">
+        <a:bodyPr spcFirstLastPara="0" vert="horz" wrap="square" lIns="152400" tIns="0" rIns="153073" bIns="0" numCol="1" spcCol="1270" anchor="t" anchorCtr="0">
           <a:noAutofit/>
         </a:bodyPr>
         <a:lstStyle/>
         <a:p>
-          <a:pPr lvl="0" algn="l" defTabSz="1155700">
+          <a:pPr lvl="0" algn="l" defTabSz="1066800">
             <a:lnSpc>
               <a:spcPct val="90000"/>
             </a:lnSpc>
@@ -2012,12 +1919,13 @@
             </a:spcAft>
           </a:pPr>
           <a:r>
-            <a:rPr lang="en-US" sz="2600" kern="1200" dirty="0"/>
-            <a:t>Step 3 Title</a:t>
+            <a:rPr lang="en-US" sz="2400" kern="1200" dirty="0" smtClean="0"/>
+            <a:t>Re-evaluation</a:t>
           </a:r>
+          <a:endParaRPr lang="en-US" sz="2400" kern="1200" dirty="0"/>
         </a:p>
         <a:p>
-          <a:pPr marL="228600" lvl="1" indent="-228600" algn="l" defTabSz="889000">
+          <a:pPr marL="171450" lvl="1" indent="-171450" algn="l" defTabSz="844550">
             <a:lnSpc>
               <a:spcPct val="90000"/>
             </a:lnSpc>
@@ -2030,12 +1938,13 @@
             <a:buChar char="••"/>
           </a:pPr>
           <a:r>
-            <a:rPr lang="en-US" sz="2000" kern="1200" dirty="0"/>
-            <a:t>Task description</a:t>
+            <a:rPr lang="en-US" sz="1900" kern="1200" dirty="0" smtClean="0"/>
+            <a:t>Backtracking when hitting a dead end</a:t>
           </a:r>
+          <a:endParaRPr lang="en-US" sz="1900" kern="1200" dirty="0"/>
         </a:p>
         <a:p>
-          <a:pPr marL="228600" lvl="1" indent="-228600" algn="l" defTabSz="889000">
+          <a:pPr marL="171450" lvl="1" indent="-171450" algn="l" defTabSz="844550">
             <a:lnSpc>
               <a:spcPct val="90000"/>
             </a:lnSpc>
@@ -2048,9 +1957,10 @@
             <a:buChar char="••"/>
           </a:pPr>
           <a:r>
-            <a:rPr lang="en-US" sz="2000" kern="1200" dirty="0"/>
-            <a:t>Task description</a:t>
+            <a:rPr lang="en-US" sz="1900" kern="1200" dirty="0" smtClean="0"/>
+            <a:t>Continuing a new path</a:t>
           </a:r>
+          <a:endParaRPr lang="en-US" sz="1900" kern="1200" dirty="0"/>
         </a:p>
       </dsp:txBody>
       <dsp:txXfrm rot="5400000">
@@ -2136,12 +2046,12 @@
         </a:fontRef>
       </dsp:style>
       <dsp:txBody>
-        <a:bodyPr spcFirstLastPara="0" vert="horz" wrap="square" lIns="165100" tIns="0" rIns="162719" bIns="0" numCol="1" spcCol="1270" anchor="t" anchorCtr="0">
+        <a:bodyPr spcFirstLastPara="0" vert="horz" wrap="square" lIns="152400" tIns="0" rIns="153073" bIns="0" numCol="1" spcCol="1270" anchor="t" anchorCtr="0">
           <a:noAutofit/>
         </a:bodyPr>
         <a:lstStyle/>
         <a:p>
-          <a:pPr lvl="0" algn="l" defTabSz="1155700">
+          <a:pPr lvl="0" algn="l" defTabSz="1066800">
             <a:lnSpc>
               <a:spcPct val="90000"/>
             </a:lnSpc>
@@ -2153,12 +2063,13 @@
             </a:spcAft>
           </a:pPr>
           <a:r>
-            <a:rPr lang="en-US" sz="2600" kern="1200" dirty="0"/>
-            <a:t>Step 4 Title</a:t>
+            <a:rPr lang="en-US" sz="2400" kern="1200" dirty="0" smtClean="0"/>
+            <a:t>Completion</a:t>
           </a:r>
+          <a:endParaRPr lang="en-US" sz="2400" kern="1200" dirty="0"/>
         </a:p>
         <a:p>
-          <a:pPr marL="228600" lvl="1" indent="-228600" algn="l" defTabSz="889000">
+          <a:pPr marL="171450" lvl="1" indent="-171450" algn="l" defTabSz="844550">
             <a:lnSpc>
               <a:spcPct val="90000"/>
             </a:lnSpc>
@@ -2171,12 +2082,13 @@
             <a:buChar char="••"/>
           </a:pPr>
           <a:r>
-            <a:rPr lang="en-US" sz="2000" kern="1200" dirty="0"/>
-            <a:t>Task description</a:t>
+            <a:rPr lang="en-US" sz="1900" kern="1200" dirty="0" smtClean="0"/>
+            <a:t>Solved tour</a:t>
           </a:r>
+          <a:endParaRPr lang="en-US" sz="1900" kern="1200" dirty="0"/>
         </a:p>
         <a:p>
-          <a:pPr marL="228600" lvl="1" indent="-228600" algn="l" defTabSz="889000">
+          <a:pPr marL="171450" lvl="1" indent="-171450" algn="l" defTabSz="844550">
             <a:lnSpc>
               <a:spcPct val="90000"/>
             </a:lnSpc>
@@ -2189,9 +2101,10 @@
             <a:buChar char="••"/>
           </a:pPr>
           <a:r>
-            <a:rPr lang="en-US" sz="2000" kern="1200" dirty="0"/>
-            <a:t>Task description</a:t>
+            <a:rPr lang="en-US" sz="1900" kern="1200" dirty="0" smtClean="0"/>
+            <a:t>Printing finished board with moves taken</a:t>
           </a:r>
+          <a:endParaRPr lang="en-US" sz="1900" kern="1200" dirty="0"/>
         </a:p>
       </dsp:txBody>
       <dsp:txXfrm rot="5400000">
@@ -3517,7 +3430,7 @@
           <a:p>
             <a:fld id="{CEEBDA6D-DC69-4DCE-BAF7-6763517D3376}" type="datetimeFigureOut">
               <a:rPr lang="en-US"/>
-              <a:t>8/18/2018</a:t>
+              <a:t>8/19/2018</a:t>
             </a:fld>
             <a:endParaRPr/>
           </a:p>
@@ -3682,7 +3595,7 @@
           <a:p>
             <a:fld id="{237F6C43-988E-4257-9A1C-C162EF036D58}" type="datetimeFigureOut">
               <a:rPr lang="en-US"/>
-              <a:t>8/18/2018</a:t>
+              <a:t>8/19/2018</a:t>
             </a:fld>
             <a:endParaRPr/>
           </a:p>
@@ -4205,7 +4118,7 @@
             <a:fld id="{2CCFE9AC-F15C-4FA0-A6F1-298829FA691D}" type="datetimeFigureOut">
               <a:rPr lang="en-US" smtClean="0"/>
               <a:pPr/>
-              <a:t>8/18/2018</a:t>
+              <a:t>8/19/2018</a:t>
             </a:fld>
             <a:endParaRPr lang="en-US" dirty="0"/>
           </a:p>
@@ -4404,7 +4317,7 @@
           <a:p>
             <a:fld id="{2CCFE9AC-F15C-4FA0-A6F1-298829FA691D}" type="datetimeFigureOut">
               <a:rPr lang="en-US"/>
-              <a:t>8/18/2018</a:t>
+              <a:t>8/19/2018</a:t>
             </a:fld>
             <a:endParaRPr/>
           </a:p>
@@ -4674,7 +4587,7 @@
           <a:p>
             <a:fld id="{2CCFE9AC-F15C-4FA0-A6F1-298829FA691D}" type="datetimeFigureOut">
               <a:rPr lang="en-US"/>
-              <a:t>8/18/2018</a:t>
+              <a:t>8/19/2018</a:t>
             </a:fld>
             <a:endParaRPr/>
           </a:p>
@@ -4866,7 +4779,7 @@
           <a:p>
             <a:fld id="{2CCFE9AC-F15C-4FA0-A6F1-298829FA691D}" type="datetimeFigureOut">
               <a:rPr lang="en-US"/>
-              <a:t>8/18/2018</a:t>
+              <a:t>8/19/2018</a:t>
             </a:fld>
             <a:endParaRPr/>
           </a:p>
@@ -5249,7 +5162,7 @@
             <a:fld id="{2CCFE9AC-F15C-4FA0-A6F1-298829FA691D}" type="datetimeFigureOut">
               <a:rPr lang="en-US" smtClean="0"/>
               <a:pPr/>
-              <a:t>8/18/2018</a:t>
+              <a:t>8/19/2018</a:t>
             </a:fld>
             <a:endParaRPr lang="en-US"/>
           </a:p>
@@ -5510,7 +5423,7 @@
           <a:p>
             <a:fld id="{2CCFE9AC-F15C-4FA0-A6F1-298829FA691D}" type="datetimeFigureOut">
               <a:rPr lang="en-US"/>
-              <a:t>8/18/2018</a:t>
+              <a:t>8/19/2018</a:t>
             </a:fld>
             <a:endParaRPr/>
           </a:p>
@@ -5884,7 +5797,7 @@
           <a:p>
             <a:fld id="{2CCFE9AC-F15C-4FA0-A6F1-298829FA691D}" type="datetimeFigureOut">
               <a:rPr lang="en-US"/>
-              <a:t>8/18/2018</a:t>
+              <a:t>8/19/2018</a:t>
             </a:fld>
             <a:endParaRPr/>
           </a:p>
@@ -6014,7 +5927,7 @@
           <a:p>
             <a:fld id="{2CCFE9AC-F15C-4FA0-A6F1-298829FA691D}" type="datetimeFigureOut">
               <a:rPr lang="en-US"/>
-              <a:t>8/18/2018</a:t>
+              <a:t>8/19/2018</a:t>
             </a:fld>
             <a:endParaRPr/>
           </a:p>
@@ -6121,7 +6034,7 @@
           <a:p>
             <a:fld id="{2CCFE9AC-F15C-4FA0-A6F1-298829FA691D}" type="datetimeFigureOut">
               <a:rPr lang="en-US"/>
-              <a:t>8/18/2018</a:t>
+              <a:t>8/19/2018</a:t>
             </a:fld>
             <a:endParaRPr/>
           </a:p>
@@ -6414,7 +6327,7 @@
           <a:p>
             <a:fld id="{2CCFE9AC-F15C-4FA0-A6F1-298829FA691D}" type="datetimeFigureOut">
               <a:rPr lang="en-US"/>
-              <a:t>8/18/2018</a:t>
+              <a:t>8/19/2018</a:t>
             </a:fld>
             <a:endParaRPr/>
           </a:p>
@@ -6684,7 +6597,7 @@
           <a:p>
             <a:fld id="{2CCFE9AC-F15C-4FA0-A6F1-298829FA691D}" type="datetimeFigureOut">
               <a:rPr lang="en-US"/>
-              <a:t>8/18/2018</a:t>
+              <a:t>8/19/2018</a:t>
             </a:fld>
             <a:endParaRPr/>
           </a:p>
@@ -6981,7 +6894,7 @@
             <a:fld id="{2CCFE9AC-F15C-4FA0-A6F1-298829FA691D}" type="datetimeFigureOut">
               <a:rPr lang="en-US" smtClean="0"/>
               <a:pPr/>
-              <a:t>8/18/2018</a:t>
+              <a:t>8/19/2018</a:t>
             </a:fld>
             <a:endParaRPr lang="en-US" dirty="0"/>
           </a:p>
@@ -7541,7 +7454,7 @@
     </p:spTree>
     <p:extLst>
       <p:ext uri="{BB962C8B-B14F-4D97-AF65-F5344CB8AC3E}">
-        <p14:creationId xmlns:p14="http://schemas.microsoft.com/office/powerpoint/2010/main" val="3303454134"/>
+        <p14:creationId xmlns:p14="http://schemas.microsoft.com/office/powerpoint/2010/main" val="87865570"/>
       </p:ext>
     </p:extLst>
   </p:cSld>
@@ -7636,7 +7549,7 @@
     </p:spTree>
     <p:extLst>
       <p:ext uri="{BB962C8B-B14F-4D97-AF65-F5344CB8AC3E}">
-        <p14:creationId xmlns:p14="http://schemas.microsoft.com/office/powerpoint/2010/main" val="87865570"/>
+        <p14:creationId xmlns:p14="http://schemas.microsoft.com/office/powerpoint/2010/main" val="158095033"/>
       </p:ext>
     </p:extLst>
   </p:cSld>
@@ -7659,101 +7572,6 @@
 </file>
 
 <file path=ppt/slides/slide12.xml><?xml version="1.0" encoding="utf-8"?>
-<p:sld xmlns:a="http://schemas.openxmlformats.org/drawingml/2006/main" xmlns:r="http://schemas.openxmlformats.org/officeDocument/2006/relationships" xmlns:p="http://schemas.openxmlformats.org/presentationml/2006/main">
-  <p:cSld>
-    <p:spTree>
-      <p:nvGrpSpPr>
-        <p:cNvPr id="1" name=""/>
-        <p:cNvGrpSpPr/>
-        <p:nvPr/>
-      </p:nvGrpSpPr>
-      <p:grpSpPr>
-        <a:xfrm>
-          <a:off x="0" y="0"/>
-          <a:ext cx="0" cy="0"/>
-          <a:chOff x="0" y="0"/>
-          <a:chExt cx="0" cy="0"/>
-        </a:xfrm>
-      </p:grpSpPr>
-      <p:sp>
-        <p:nvSpPr>
-          <p:cNvPr id="2" name="Title 1"/>
-          <p:cNvSpPr>
-            <a:spLocks noGrp="1"/>
-          </p:cNvSpPr>
-          <p:nvPr>
-            <p:ph type="title"/>
-          </p:nvPr>
-        </p:nvSpPr>
-        <p:spPr/>
-        <p:txBody>
-          <a:bodyPr/>
-          <a:lstStyle/>
-          <a:p>
-            <a:r>
-              <a:rPr lang="en-US" dirty="0"/>
-              <a:t>Add a Slide Title - 5</a:t>
-            </a:r>
-          </a:p>
-        </p:txBody>
-      </p:sp>
-      <p:sp>
-        <p:nvSpPr>
-          <p:cNvPr id="4" name="Text Placeholder 3"/>
-          <p:cNvSpPr>
-            <a:spLocks noGrp="1"/>
-          </p:cNvSpPr>
-          <p:nvPr>
-            <p:ph type="body" sz="half" idx="2"/>
-          </p:nvPr>
-        </p:nvSpPr>
-        <p:spPr/>
-        <p:txBody>
-          <a:bodyPr/>
-          <a:lstStyle/>
-          <a:p>
-            <a:endParaRPr lang="en-US"/>
-          </a:p>
-        </p:txBody>
-      </p:sp>
-      <p:sp>
-        <p:nvSpPr>
-          <p:cNvPr id="3" name="Picture Placeholder 2" descr="An empty placeholder to add an image. Click on the placeholder and select the image that you wish to add"/>
-          <p:cNvSpPr>
-            <a:spLocks noGrp="1"/>
-          </p:cNvSpPr>
-          <p:nvPr>
-            <p:ph type="pic" idx="1"/>
-          </p:nvPr>
-        </p:nvSpPr>
-        <p:spPr/>
-      </p:sp>
-    </p:spTree>
-    <p:extLst>
-      <p:ext uri="{BB962C8B-B14F-4D97-AF65-F5344CB8AC3E}">
-        <p14:creationId xmlns:p14="http://schemas.microsoft.com/office/powerpoint/2010/main" val="158095033"/>
-      </p:ext>
-    </p:extLst>
-  </p:cSld>
-  <p:clrMapOvr>
-    <a:masterClrMapping/>
-  </p:clrMapOvr>
-  <mc:AlternateContent xmlns:mc="http://schemas.openxmlformats.org/markup-compatibility/2006" xmlns:p14="http://schemas.microsoft.com/office/powerpoint/2010/main">
-    <mc:Choice Requires="p14">
-      <p:transition spd="med" p14:dur="700">
-        <p:fade/>
-      </p:transition>
-    </mc:Choice>
-    <mc:Fallback xmlns="">
-      <p:transition spd="med">
-        <p:fade/>
-      </p:transition>
-    </mc:Fallback>
-  </mc:AlternateContent>
-</p:sld>
-</file>
-
-<file path=ppt/slides/slide13.xml><?xml version="1.0" encoding="utf-8"?>
 <p:sld xmlns:a="http://schemas.openxmlformats.org/drawingml/2006/main" xmlns:r="http://schemas.openxmlformats.org/officeDocument/2006/relationships" xmlns:p="http://schemas.openxmlformats.org/presentationml/2006/main">
   <p:cSld>
     <p:spTree>
@@ -8435,23 +8253,28 @@
             <p:ph type="body" idx="1"/>
           </p:nvPr>
         </p:nvSpPr>
-        <p:spPr/>
+        <p:spPr>
+          <a:xfrm>
+            <a:off x="1280160" y="1828456"/>
+            <a:ext cx="4489704" cy="2494162"/>
+          </a:xfrm>
+        </p:spPr>
         <p:txBody>
           <a:bodyPr/>
           <a:lstStyle/>
           <a:p>
-            <a:endParaRPr lang="en-US"/>
-          </a:p>
-        </p:txBody>
-      </p:sp>
-      <p:sp>
-        <p:nvSpPr>
-          <p:cNvPr id="4" name="Content Placeholder 3"/>
-          <p:cNvSpPr>
-            <a:spLocks noGrp="1"/>
-          </p:cNvSpPr>
-          <p:nvPr>
-            <p:ph sz="half" idx="2"/>
+            <a:endParaRPr lang="en-US" dirty="0"/>
+          </a:p>
+        </p:txBody>
+      </p:sp>
+      <p:sp>
+        <p:nvSpPr>
+          <p:cNvPr id="5" name="Text Placeholder 4"/>
+          <p:cNvSpPr>
+            <a:spLocks noGrp="1"/>
+          </p:cNvSpPr>
+          <p:nvPr>
+            <p:ph type="body" sz="quarter" idx="3"/>
           </p:nvPr>
         </p:nvSpPr>
         <p:spPr/>
@@ -8459,18 +8282,22 @@
           <a:bodyPr/>
           <a:lstStyle/>
           <a:p>
-            <a:endParaRPr lang="en-US"/>
-          </a:p>
-        </p:txBody>
-      </p:sp>
-      <p:sp>
-        <p:nvSpPr>
-          <p:cNvPr id="5" name="Text Placeholder 4"/>
-          <p:cNvSpPr>
-            <a:spLocks noGrp="1"/>
-          </p:cNvSpPr>
-          <p:nvPr>
-            <p:ph type="body" sz="quarter" idx="3"/>
+            <a:r>
+              <a:rPr lang="en-US" dirty="0" smtClean="0"/>
+              <a:t>Quick facts</a:t>
+            </a:r>
+            <a:endParaRPr lang="en-US" dirty="0"/>
+          </a:p>
+        </p:txBody>
+      </p:sp>
+      <p:sp>
+        <p:nvSpPr>
+          <p:cNvPr id="6" name="Content Placeholder 5"/>
+          <p:cNvSpPr>
+            <a:spLocks noGrp="1"/>
+          </p:cNvSpPr>
+          <p:nvPr>
+            <p:ph sz="quarter" idx="4"/>
           </p:nvPr>
         </p:nvSpPr>
         <p:spPr/>
@@ -8478,26 +8305,137 @@
           <a:bodyPr/>
           <a:lstStyle/>
           <a:p>
-            <a:endParaRPr lang="en-US"/>
-          </a:p>
-        </p:txBody>
-      </p:sp>
-      <p:sp>
-        <p:nvSpPr>
-          <p:cNvPr id="6" name="Content Placeholder 5"/>
-          <p:cNvSpPr>
-            <a:spLocks noGrp="1"/>
-          </p:cNvSpPr>
-          <p:nvPr>
-            <p:ph sz="quarter" idx="4"/>
-          </p:nvPr>
-        </p:nvSpPr>
-        <p:spPr/>
-        <p:txBody>
-          <a:bodyPr/>
+            <a:r>
+              <a:rPr lang="en-US" dirty="0" smtClean="0"/>
+              <a:t>First reference of the problem was in 9</a:t>
+            </a:r>
+            <a:r>
+              <a:rPr lang="en-US" baseline="30000" dirty="0" smtClean="0"/>
+              <a:t>th</a:t>
+            </a:r>
+            <a:r>
+              <a:rPr lang="en-US" dirty="0" smtClean="0"/>
+              <a:t> century AD</a:t>
+            </a:r>
+          </a:p>
+          <a:p>
+            <a:r>
+              <a:rPr lang="en-AU" dirty="0" smtClean="0"/>
+              <a:t>26,534,728,821,064 directed closed tours on 8 x 8 board</a:t>
+            </a:r>
+          </a:p>
+          <a:p>
+            <a:r>
+              <a:rPr lang="en-AU" dirty="0"/>
+              <a:t>4×10</a:t>
+            </a:r>
+            <a:r>
+              <a:rPr lang="en-AU" baseline="30000" dirty="0"/>
+              <a:t>51</a:t>
+            </a:r>
+            <a:r>
+              <a:rPr lang="en-AU" dirty="0"/>
+              <a:t> possible move </a:t>
+            </a:r>
+            <a:r>
+              <a:rPr lang="en-AU" dirty="0" smtClean="0"/>
+              <a:t>sequences on 8x8 board</a:t>
+            </a:r>
+          </a:p>
+        </p:txBody>
+      </p:sp>
+      <p:pic>
+        <p:nvPicPr>
+          <p:cNvPr id="1026" name="Picture 2" descr="../_images/knightmoves.png"/>
+          <p:cNvPicPr>
+            <a:picLocks noGrp="1" noChangeAspect="1" noChangeArrowheads="1"/>
+          </p:cNvPicPr>
+          <p:nvPr>
+            <p:ph sz="half" idx="2"/>
+          </p:nvPr>
+        </p:nvPicPr>
+        <p:blipFill>
+          <a:blip r:embed="rId2">
+            <a:extLst>
+              <a:ext uri="{28A0092B-C50C-407E-A947-70E740481C1C}">
+                <a14:useLocalDpi xmlns:a14="http://schemas.microsoft.com/office/drawing/2010/main" val="0"/>
+              </a:ext>
+            </a:extLst>
+          </a:blip>
+          <a:srcRect/>
+          <a:stretch>
+            <a:fillRect/>
+          </a:stretch>
+        </p:blipFill>
+        <p:spPr bwMode="auto">
+          <a:xfrm>
+            <a:off x="1280160" y="4405740"/>
+            <a:ext cx="3291568" cy="1865222"/>
+          </a:xfrm>
+          <a:prstGeom prst="rect">
+            <a:avLst/>
+          </a:prstGeom>
+          <a:noFill/>
+          <a:extLst>
+            <a:ext uri="{909E8E84-426E-40DD-AFC4-6F175D3DCCD1}">
+              <a14:hiddenFill xmlns:a14="http://schemas.microsoft.com/office/drawing/2010/main">
+                <a:solidFill>
+                  <a:srgbClr val="FFFFFF"/>
+                </a:solidFill>
+              </a14:hiddenFill>
+            </a:ext>
+          </a:extLst>
+        </p:spPr>
+      </p:pic>
+      <p:sp>
+        <p:nvSpPr>
+          <p:cNvPr id="8" name="TextBox 7"/>
+          <p:cNvSpPr txBox="1"/>
+          <p:nvPr/>
+        </p:nvSpPr>
+        <p:spPr>
+          <a:xfrm>
+            <a:off x="1280160" y="6270962"/>
+            <a:ext cx="2369128" cy="369332"/>
+          </a:xfrm>
+          <a:prstGeom prst="rect">
+            <a:avLst/>
+          </a:prstGeom>
+          <a:noFill/>
+        </p:spPr>
+        <p:txBody>
+          <a:bodyPr wrap="square" rtlCol="0">
+            <a:spAutoFit/>
+          </a:bodyPr>
           <a:lstStyle/>
           <a:p>
-            <a:endParaRPr lang="en-US"/>
+            <a:r>
+              <a:rPr lang="en-AU" sz="600" dirty="0" smtClean="0"/>
+              <a:t>Image from: </a:t>
+            </a:r>
+            <a:r>
+              <a:rPr lang="en-AU" sz="600" dirty="0" smtClean="0">
+                <a:hlinkClick r:id="rId3"/>
+              </a:rPr>
+              <a:t>http</a:t>
+            </a:r>
+            <a:r>
+              <a:rPr lang="en-AU" sz="600" dirty="0">
+                <a:hlinkClick r:id="rId3"/>
+              </a:rPr>
+              <a:t>://</a:t>
+            </a:r>
+            <a:r>
+              <a:rPr lang="en-AU" sz="600" dirty="0" smtClean="0">
+                <a:hlinkClick r:id="rId3"/>
+              </a:rPr>
+              <a:t>interactivepython.org/courselib/static/pythonds/Graphs/BuildingtheKnightsTourGraph.html</a:t>
+            </a:r>
+            <a:r>
+              <a:rPr lang="en-AU" sz="600" dirty="0" smtClean="0"/>
+              <a:t> </a:t>
+            </a:r>
+            <a:endParaRPr lang="en-AU" sz="600" dirty="0"/>
           </a:p>
         </p:txBody>
       </p:sp>
@@ -8576,7 +8514,7 @@
             <p:ph idx="1"/>
             <p:extLst>
               <p:ext uri="{D42A27DB-BD31-4B8C-83A1-F6EECF244321}">
-                <p14:modId xmlns:p14="http://schemas.microsoft.com/office/powerpoint/2010/main" val="2530888379"/>
+                <p14:modId xmlns:p14="http://schemas.microsoft.com/office/powerpoint/2010/main" val="1180906044"/>
               </p:ext>
             </p:extLst>
           </p:nvPr>
@@ -8756,7 +8694,7 @@
       </p:grpSpPr>
       <p:sp>
         <p:nvSpPr>
-          <p:cNvPr id="13" name="Title 1"/>
+          <p:cNvPr id="2" name="Title 1"/>
           <p:cNvSpPr>
             <a:spLocks noGrp="1"/>
           </p:cNvSpPr>
@@ -8771,7 +8709,7 @@
           <a:p>
             <a:r>
               <a:rPr lang="en-US" dirty="0" smtClean="0"/>
-              <a:t>Requirements</a:t>
+              <a:t>Limitations and constraints</a:t>
             </a:r>
             <a:endParaRPr lang="en-US" dirty="0"/>
           </a:p>
@@ -8779,12 +8717,12 @@
       </p:sp>
       <p:sp>
         <p:nvSpPr>
-          <p:cNvPr id="14" name="Content Placeholder 2"/>
-          <p:cNvSpPr>
-            <a:spLocks noGrp="1"/>
-          </p:cNvSpPr>
-          <p:nvPr>
-            <p:ph idx="1"/>
+          <p:cNvPr id="4" name="Text Placeholder 3"/>
+          <p:cNvSpPr>
+            <a:spLocks noGrp="1"/>
+          </p:cNvSpPr>
+          <p:nvPr>
+            <p:ph type="body" sz="half" idx="2"/>
           </p:nvPr>
         </p:nvSpPr>
         <p:spPr/>
@@ -8793,40 +8731,42 @@
           <a:lstStyle/>
           <a:p>
             <a:r>
-              <a:rPr lang="en-AU" dirty="0"/>
-              <a:t>1) Explanation of the Knight’s Tour problem, and what makes it challenging to solve</a:t>
-            </a:r>
-          </a:p>
-          <a:p>
-            <a:r>
-              <a:rPr lang="en-AU" dirty="0"/>
-              <a:t>2) Explanation of the solution algorithm you chose or designed</a:t>
-            </a:r>
-          </a:p>
-          <a:p>
-            <a:r>
-              <a:rPr lang="en-AU" dirty="0"/>
-              <a:t>3) Explanation and demonstration of your software implementation of this algorithm</a:t>
-            </a:r>
-          </a:p>
-          <a:p>
-            <a:r>
-              <a:rPr lang="en-AU" dirty="0"/>
-              <a:t>4) Discussion of any limitations or constraints of your solution</a:t>
-            </a:r>
-          </a:p>
-          <a:p>
-            <a:r>
-              <a:rPr lang="en-AU" dirty="0"/>
-              <a:t>5) You must also clearly identify </a:t>
-            </a:r>
-            <a:r>
-              <a:rPr lang="en-AU" dirty="0" smtClean="0"/>
-              <a:t>which group </a:t>
-            </a:r>
-            <a:r>
-              <a:rPr lang="en-AU" dirty="0"/>
-              <a:t>members did what work, to contribute to the solution</a:t>
+              <a:rPr lang="en-US" dirty="0" smtClean="0"/>
+              <a:t>No test cases for bugs when solver doesn’t find solution</a:t>
+            </a:r>
+          </a:p>
+          <a:p>
+            <a:endParaRPr lang="en-US" dirty="0"/>
+          </a:p>
+          <a:p>
+            <a:endParaRPr lang="en-US" dirty="0"/>
+          </a:p>
+        </p:txBody>
+      </p:sp>
+      <p:sp>
+        <p:nvSpPr>
+          <p:cNvPr id="3" name="Content Placeholder 2"/>
+          <p:cNvSpPr>
+            <a:spLocks noGrp="1"/>
+          </p:cNvSpPr>
+          <p:nvPr>
+            <p:ph idx="1"/>
+          </p:nvPr>
+        </p:nvSpPr>
+        <p:spPr/>
+        <p:txBody>
+          <a:bodyPr/>
+          <a:lstStyle/>
+          <a:p>
+            <a:r>
+              <a:rPr lang="en-US" dirty="0" smtClean="0"/>
+              <a:t>In the tests we ran it found a solution very quickly on most boards</a:t>
+            </a:r>
+          </a:p>
+          <a:p>
+            <a:r>
+              <a:rPr lang="en-US" dirty="0" smtClean="0"/>
+              <a:t>Would add test cases if needed to enhance the program</a:t>
             </a:r>
             <a:endParaRPr lang="en-US" dirty="0"/>
           </a:p>
@@ -8835,7 +8775,7 @@
     </p:spTree>
     <p:extLst>
       <p:ext uri="{BB962C8B-B14F-4D97-AF65-F5344CB8AC3E}">
-        <p14:creationId xmlns:p14="http://schemas.microsoft.com/office/powerpoint/2010/main" val="1440355687"/>
+        <p14:creationId xmlns:p14="http://schemas.microsoft.com/office/powerpoint/2010/main" val="1457430339"/>
       </p:ext>
     </p:extLst>
   </p:cSld>
@@ -8876,7 +8816,7 @@
       </p:grpSpPr>
       <p:sp>
         <p:nvSpPr>
-          <p:cNvPr id="2" name="Title 1"/>
+          <p:cNvPr id="13" name="Title 1"/>
           <p:cNvSpPr>
             <a:spLocks noGrp="1"/>
           </p:cNvSpPr>
@@ -8891,7 +8831,7 @@
           <a:p>
             <a:r>
               <a:rPr lang="en-US" dirty="0" smtClean="0"/>
-              <a:t>Limitations and constraints</a:t>
+              <a:t>Requirements</a:t>
             </a:r>
             <a:endParaRPr lang="en-US" dirty="0"/>
           </a:p>
@@ -8899,12 +8839,12 @@
       </p:sp>
       <p:sp>
         <p:nvSpPr>
-          <p:cNvPr id="4" name="Text Placeholder 3"/>
-          <p:cNvSpPr>
-            <a:spLocks noGrp="1"/>
-          </p:cNvSpPr>
-          <p:nvPr>
-            <p:ph type="body" sz="half" idx="2"/>
+          <p:cNvPr id="14" name="Content Placeholder 2"/>
+          <p:cNvSpPr>
+            <a:spLocks noGrp="1"/>
+          </p:cNvSpPr>
+          <p:nvPr>
+            <p:ph idx="1"/>
           </p:nvPr>
         </p:nvSpPr>
         <p:spPr/>
@@ -8912,33 +8852,50 @@
           <a:bodyPr/>
           <a:lstStyle/>
           <a:p>
-            <a:endParaRPr lang="en-US"/>
-          </a:p>
-        </p:txBody>
-      </p:sp>
-      <p:sp>
-        <p:nvSpPr>
-          <p:cNvPr id="3" name="Content Placeholder 2"/>
-          <p:cNvSpPr>
-            <a:spLocks noGrp="1"/>
-          </p:cNvSpPr>
-          <p:nvPr>
-            <p:ph idx="1"/>
-          </p:nvPr>
-        </p:nvSpPr>
-        <p:spPr/>
-        <p:txBody>
-          <a:bodyPr/>
-          <a:lstStyle/>
-          <a:p>
-            <a:endParaRPr lang="en-US"/>
+            <a:r>
+              <a:rPr lang="en-AU" dirty="0"/>
+              <a:t>1) Explanation of the Knight’s Tour problem, and what makes it challenging to solve</a:t>
+            </a:r>
+          </a:p>
+          <a:p>
+            <a:r>
+              <a:rPr lang="en-AU" dirty="0"/>
+              <a:t>2) Explanation of the solution algorithm you chose or designed</a:t>
+            </a:r>
+          </a:p>
+          <a:p>
+            <a:r>
+              <a:rPr lang="en-AU" dirty="0"/>
+              <a:t>3) Explanation and demonstration of your software implementation of this algorithm</a:t>
+            </a:r>
+          </a:p>
+          <a:p>
+            <a:r>
+              <a:rPr lang="en-AU" dirty="0"/>
+              <a:t>4) Discussion of any limitations or constraints of your solution</a:t>
+            </a:r>
+          </a:p>
+          <a:p>
+            <a:r>
+              <a:rPr lang="en-AU" dirty="0"/>
+              <a:t>5) You must also clearly identify </a:t>
+            </a:r>
+            <a:r>
+              <a:rPr lang="en-AU" dirty="0" smtClean="0"/>
+              <a:t>which group </a:t>
+            </a:r>
+            <a:r>
+              <a:rPr lang="en-AU" dirty="0"/>
+              <a:t>members did what work, to contribute to the solution</a:t>
+            </a:r>
+            <a:endParaRPr lang="en-US" dirty="0"/>
           </a:p>
         </p:txBody>
       </p:sp>
     </p:spTree>
     <p:extLst>
       <p:ext uri="{BB962C8B-B14F-4D97-AF65-F5344CB8AC3E}">
-        <p14:creationId xmlns:p14="http://schemas.microsoft.com/office/powerpoint/2010/main" val="1457430339"/>
+        <p14:creationId xmlns:p14="http://schemas.microsoft.com/office/powerpoint/2010/main" val="1440355687"/>
       </p:ext>
     </p:extLst>
   </p:cSld>
@@ -8979,7 +8936,7 @@
       </p:grpSpPr>
       <p:sp>
         <p:nvSpPr>
-          <p:cNvPr id="13" name="Title 1"/>
+          <p:cNvPr id="2" name="Title 1"/>
           <p:cNvSpPr>
             <a:spLocks noGrp="1"/>
           </p:cNvSpPr>
@@ -8994,19 +8951,19 @@
           <a:p>
             <a:r>
               <a:rPr lang="en-US" dirty="0"/>
-              <a:t>Add a Slide Title - 1</a:t>
-            </a:r>
-          </a:p>
-        </p:txBody>
-      </p:sp>
-      <p:sp>
-        <p:nvSpPr>
-          <p:cNvPr id="14" name="Text Placeholder 2"/>
-          <p:cNvSpPr>
-            <a:spLocks noGrp="1"/>
-          </p:cNvSpPr>
-          <p:nvPr>
-            <p:ph type="body" idx="1"/>
+              <a:t>Add a Slide Title - 5</a:t>
+            </a:r>
+          </a:p>
+        </p:txBody>
+      </p:sp>
+      <p:sp>
+        <p:nvSpPr>
+          <p:cNvPr id="4" name="Text Placeholder 3"/>
+          <p:cNvSpPr>
+            <a:spLocks noGrp="1"/>
+          </p:cNvSpPr>
+          <p:nvPr>
+            <p:ph type="body" sz="half" idx="2"/>
           </p:nvPr>
         </p:nvSpPr>
         <p:spPr/>
@@ -9017,11 +8974,23 @@
             <a:endParaRPr lang="en-US"/>
           </a:p>
         </p:txBody>
+      </p:sp>
+      <p:sp>
+        <p:nvSpPr>
+          <p:cNvPr id="3" name="Picture Placeholder 2" descr="An empty placeholder to add an image. Click on the placeholder and select the image that you wish to add"/>
+          <p:cNvSpPr>
+            <a:spLocks noGrp="1"/>
+          </p:cNvSpPr>
+          <p:nvPr>
+            <p:ph type="pic" idx="1"/>
+          </p:nvPr>
+        </p:nvSpPr>
+        <p:spPr/>
       </p:sp>
     </p:spTree>
     <p:extLst>
       <p:ext uri="{BB962C8B-B14F-4D97-AF65-F5344CB8AC3E}">
-        <p14:creationId xmlns:p14="http://schemas.microsoft.com/office/powerpoint/2010/main" val="3240797513"/>
+        <p14:creationId xmlns:p14="http://schemas.microsoft.com/office/powerpoint/2010/main" val="3734198996"/>
       </p:ext>
     </p:extLst>
   </p:cSld>
@@ -9116,7 +9085,7 @@
     </p:spTree>
     <p:extLst>
       <p:ext uri="{BB962C8B-B14F-4D97-AF65-F5344CB8AC3E}">
-        <p14:creationId xmlns:p14="http://schemas.microsoft.com/office/powerpoint/2010/main" val="3734198996"/>
+        <p14:creationId xmlns:p14="http://schemas.microsoft.com/office/powerpoint/2010/main" val="3303454134"/>
       </p:ext>
     </p:extLst>
   </p:cSld>

</xml_diff>

<commit_message>
Even less draft of presentation
</commit_message>
<xml_diff>
--- a/PST_2.pptx
+++ b/PST_2.pptx
@@ -5,24 +5,21 @@
     <p:sldMasterId id="2147483648" r:id="rId1"/>
   </p:sldMasterIdLst>
   <p:notesMasterIdLst>
-    <p:notesMasterId r:id="rId14"/>
+    <p:notesMasterId r:id="rId11"/>
   </p:notesMasterIdLst>
   <p:handoutMasterIdLst>
-    <p:handoutMasterId r:id="rId15"/>
+    <p:handoutMasterId r:id="rId12"/>
   </p:handoutMasterIdLst>
   <p:sldIdLst>
     <p:sldId id="258" r:id="rId2"/>
-    <p:sldId id="262" r:id="rId3"/>
-    <p:sldId id="265" r:id="rId4"/>
-    <p:sldId id="263" r:id="rId5"/>
-    <p:sldId id="266" r:id="rId6"/>
-    <p:sldId id="268" r:id="rId7"/>
-    <p:sldId id="260" r:id="rId8"/>
-    <p:sldId id="269" r:id="rId9"/>
-    <p:sldId id="270" r:id="rId10"/>
-    <p:sldId id="273" r:id="rId11"/>
-    <p:sldId id="272" r:id="rId12"/>
-    <p:sldId id="271" r:id="rId13"/>
+    <p:sldId id="265" r:id="rId3"/>
+    <p:sldId id="262" r:id="rId4"/>
+    <p:sldId id="269" r:id="rId5"/>
+    <p:sldId id="263" r:id="rId6"/>
+    <p:sldId id="266" r:id="rId7"/>
+    <p:sldId id="268" r:id="rId8"/>
+    <p:sldId id="270" r:id="rId9"/>
+    <p:sldId id="271" r:id="rId10"/>
   </p:sldIdLst>
   <p:sldSz cx="12192000" cy="6858000"/>
   <p:notesSz cx="6858000" cy="9144000"/>
@@ -976,7 +973,7 @@
         <a:p>
           <a:r>
             <a:rPr lang="en-US" dirty="0" smtClean="0"/>
-            <a:t>Depth-first search</a:t>
+            <a:t>Uninformed Search: Depth-first search</a:t>
           </a:r>
           <a:endParaRPr lang="en-US" dirty="0"/>
         </a:p>
@@ -1013,7 +1010,7 @@
         <a:p>
           <a:r>
             <a:rPr lang="en-US" dirty="0" smtClean="0"/>
-            <a:t>Warnsdorff’s Rule</a:t>
+            <a:t>Informed search: Warnsdorff’s Rule</a:t>
           </a:r>
           <a:endParaRPr lang="en-US" dirty="0"/>
         </a:p>
@@ -1031,43 +1028,6 @@
       </dgm:t>
     </dgm:pt>
     <dgm:pt modelId="{0D19FA60-5F9C-420B-AD2F-A0656A7F0783}" type="sibTrans" cxnId="{59DDA576-1BA9-49E8-9D1D-361FF667A19A}">
-      <dgm:prSet/>
-      <dgm:spPr/>
-      <dgm:t>
-        <a:bodyPr/>
-        <a:lstStyle/>
-        <a:p>
-          <a:endParaRPr lang="en-US"/>
-        </a:p>
-      </dgm:t>
-    </dgm:pt>
-    <dgm:pt modelId="{44B2544A-D122-4B95-A36C-B03D9E272B48}">
-      <dgm:prSet phldrT="[Text]"/>
-      <dgm:spPr/>
-      <dgm:t>
-        <a:bodyPr/>
-        <a:lstStyle/>
-        <a:p>
-          <a:r>
-            <a:rPr lang="en-US" dirty="0" smtClean="0"/>
-            <a:t>Black magic/sacrificing virgins</a:t>
-          </a:r>
-          <a:endParaRPr lang="en-US" dirty="0"/>
-        </a:p>
-      </dgm:t>
-    </dgm:pt>
-    <dgm:pt modelId="{9EE40E78-C1B8-4A87-A668-53AD816CED24}" type="parTrans" cxnId="{F89EA6DF-D106-435E-9337-D23286A767A6}">
-      <dgm:prSet/>
-      <dgm:spPr/>
-      <dgm:t>
-        <a:bodyPr/>
-        <a:lstStyle/>
-        <a:p>
-          <a:endParaRPr lang="en-US"/>
-        </a:p>
-      </dgm:t>
-    </dgm:pt>
-    <dgm:pt modelId="{F32DECE0-DC7F-4DCF-A10D-96A117A49197}" type="sibTrans" cxnId="{F89EA6DF-D106-435E-9337-D23286A767A6}">
       <dgm:prSet/>
       <dgm:spPr/>
       <dgm:t>
@@ -1465,8 +1425,6 @@
   </dgm:ptLst>
   <dgm:cxnLst>
     <dgm:cxn modelId="{1B8E71B0-2D3A-4AB0-8843-CFDACEDC3198}" srcId="{6D0E5D9F-7263-4526-A227-51301233F549}" destId="{F3256203-D9D1-492A-B801-68C1A32486F0}" srcOrd="0" destOrd="0" parTransId="{E9A20291-2E30-4C14-BB7D-DC095A20ECB6}" sibTransId="{6C9440D0-8847-40C0-98BC-2B5EA5745C3A}"/>
-    <dgm:cxn modelId="{F89EA6DF-D106-435E-9337-D23286A767A6}" srcId="{B6E26FFC-9977-4BBC-BEC7-3D6B63754E52}" destId="{44B2544A-D122-4B95-A36C-B03D9E272B48}" srcOrd="2" destOrd="0" parTransId="{9EE40E78-C1B8-4A87-A668-53AD816CED24}" sibTransId="{F32DECE0-DC7F-4DCF-A10D-96A117A49197}"/>
-    <dgm:cxn modelId="{3B50A2DD-8777-42C9-93E1-40A37E404C87}" type="presOf" srcId="{44B2544A-D122-4B95-A36C-B03D9E272B48}" destId="{DAD9059A-916A-4916-A2A8-B42491568DD3}" srcOrd="0" destOrd="3" presId="urn:microsoft.com/office/officeart/2005/8/layout/hList6"/>
     <dgm:cxn modelId="{C8C462C6-33A3-4E8B-91FE-36DBE92F1C4A}" srcId="{CF9055CF-8DEB-4A02-949A-DE72B6AC5D37}" destId="{6D0E5D9F-7263-4526-A227-51301233F549}" srcOrd="2" destOrd="0" parTransId="{23416D07-25F8-426C-BC65-639E6BCF4D6D}" sibTransId="{DE289E29-1989-4D8E-8AA6-F030105B3F13}"/>
     <dgm:cxn modelId="{59DDA576-1BA9-49E8-9D1D-361FF667A19A}" srcId="{B6E26FFC-9977-4BBC-BEC7-3D6B63754E52}" destId="{62831651-7C26-466C-BAA4-31EA8D14E47A}" srcOrd="1" destOrd="0" parTransId="{0F3EB6E4-07A5-4199-9C2F-8B91F53579FE}" sibTransId="{0D19FA60-5F9C-420B-AD2F-A0656A7F0783}"/>
     <dgm:cxn modelId="{A76240AD-13F6-40C0-BD9B-102D5EC0AE51}" srcId="{CF9055CF-8DEB-4A02-949A-DE72B6AC5D37}" destId="{E5E95E82-EF79-43CA-AA86-43B0E1CBCD3F}" srcOrd="3" destOrd="0" parTransId="{FD76A3AE-1B6C-45A0-8E84-63160283749F}" sibTransId="{BF76010C-5523-4E13-B3E7-886DCE6AEBD4}"/>
@@ -1595,7 +1553,7 @@
         </a:fontRef>
       </dsp:style>
       <dsp:txBody>
-        <a:bodyPr spcFirstLastPara="0" vert="horz" wrap="square" lIns="152400" tIns="0" rIns="153073" bIns="0" numCol="1" spcCol="1270" anchor="t" anchorCtr="0">
+        <a:bodyPr spcFirstLastPara="0" vert="horz" wrap="square" lIns="152400" tIns="0" rIns="151147" bIns="0" numCol="1" spcCol="1270" anchor="t" anchorCtr="0">
           <a:noAutofit/>
         </a:bodyPr>
         <a:lstStyle/>
@@ -1739,7 +1697,7 @@
         </a:fontRef>
       </dsp:style>
       <dsp:txBody>
-        <a:bodyPr spcFirstLastPara="0" vert="horz" wrap="square" lIns="152400" tIns="0" rIns="153073" bIns="0" numCol="1" spcCol="1270" anchor="t" anchorCtr="0">
+        <a:bodyPr spcFirstLastPara="0" vert="horz" wrap="square" lIns="152400" tIns="0" rIns="151147" bIns="0" numCol="1" spcCol="1270" anchor="t" anchorCtr="0">
           <a:noAutofit/>
         </a:bodyPr>
         <a:lstStyle/>
@@ -1776,7 +1734,7 @@
           </a:pPr>
           <a:r>
             <a:rPr lang="en-US" sz="1900" kern="1200" dirty="0" smtClean="0"/>
-            <a:t>Depth-first search</a:t>
+            <a:t>Uninformed Search: Depth-first search</a:t>
           </a:r>
           <a:endParaRPr lang="en-US" sz="1900" kern="1200" dirty="0"/>
         </a:p>
@@ -1795,26 +1753,7 @@
           </a:pPr>
           <a:r>
             <a:rPr lang="en-US" sz="1900" kern="1200" dirty="0" smtClean="0"/>
-            <a:t>Warnsdorff’s Rule</a:t>
-          </a:r>
-          <a:endParaRPr lang="en-US" sz="1900" kern="1200" dirty="0"/>
-        </a:p>
-        <a:p>
-          <a:pPr marL="171450" lvl="1" indent="-171450" algn="l" defTabSz="844550">
-            <a:lnSpc>
-              <a:spcPct val="90000"/>
-            </a:lnSpc>
-            <a:spcBef>
-              <a:spcPct val="0"/>
-            </a:spcBef>
-            <a:spcAft>
-              <a:spcPct val="15000"/>
-            </a:spcAft>
-            <a:buChar char="••"/>
-          </a:pPr>
-          <a:r>
-            <a:rPr lang="en-US" sz="1900" kern="1200" dirty="0" smtClean="0"/>
-            <a:t>Black magic/sacrificing virgins</a:t>
+            <a:t>Informed search: Warnsdorff’s Rule</a:t>
           </a:r>
           <a:endParaRPr lang="en-US" sz="1900" kern="1200" dirty="0"/>
         </a:p>
@@ -1902,7 +1841,7 @@
         </a:fontRef>
       </dsp:style>
       <dsp:txBody>
-        <a:bodyPr spcFirstLastPara="0" vert="horz" wrap="square" lIns="152400" tIns="0" rIns="153073" bIns="0" numCol="1" spcCol="1270" anchor="t" anchorCtr="0">
+        <a:bodyPr spcFirstLastPara="0" vert="horz" wrap="square" lIns="152400" tIns="0" rIns="151147" bIns="0" numCol="1" spcCol="1270" anchor="t" anchorCtr="0">
           <a:noAutofit/>
         </a:bodyPr>
         <a:lstStyle/>
@@ -2046,7 +1985,7 @@
         </a:fontRef>
       </dsp:style>
       <dsp:txBody>
-        <a:bodyPr spcFirstLastPara="0" vert="horz" wrap="square" lIns="152400" tIns="0" rIns="153073" bIns="0" numCol="1" spcCol="1270" anchor="t" anchorCtr="0">
+        <a:bodyPr spcFirstLastPara="0" vert="horz" wrap="square" lIns="152400" tIns="0" rIns="151147" bIns="0" numCol="1" spcCol="1270" anchor="t" anchorCtr="0">
           <a:noAutofit/>
         </a:bodyPr>
         <a:lstStyle/>
@@ -7381,7 +7320,7 @@
 </p:sld>
 </file>
 
-<file path=ppt/slides/slide10.xml><?xml version="1.0" encoding="utf-8"?>
+<file path=ppt/slides/slide2.xml><?xml version="1.0" encoding="utf-8"?>
 <p:sld xmlns:a="http://schemas.openxmlformats.org/drawingml/2006/main" xmlns:r="http://schemas.openxmlformats.org/officeDocument/2006/relationships" xmlns:p="http://schemas.openxmlformats.org/presentationml/2006/main">
   <p:cSld>
     <p:spTree>
@@ -7414,47 +7353,242 @@
           <a:lstStyle/>
           <a:p>
             <a:r>
-              <a:rPr lang="en-US" dirty="0"/>
-              <a:t>Add a Slide Title - 5</a:t>
-            </a:r>
-          </a:p>
-        </p:txBody>
-      </p:sp>
-      <p:sp>
-        <p:nvSpPr>
-          <p:cNvPr id="4" name="Text Placeholder 3"/>
+              <a:rPr lang="en-US" dirty="0" smtClean="0"/>
+              <a:t>The Knight’s tour problem</a:t>
+            </a:r>
+            <a:endParaRPr lang="en-US" dirty="0"/>
+          </a:p>
+        </p:txBody>
+      </p:sp>
+      <p:sp>
+        <p:nvSpPr>
+          <p:cNvPr id="3" name="Text Placeholder 2"/>
           <p:cNvSpPr>
             <a:spLocks noGrp="1"/>
           </p:cNvSpPr>
           <p:nvPr>
-            <p:ph type="body" sz="half" idx="2"/>
+            <p:ph type="body" idx="1"/>
           </p:nvPr>
         </p:nvSpPr>
-        <p:spPr/>
+        <p:spPr>
+          <a:xfrm>
+            <a:off x="1280160" y="2269374"/>
+            <a:ext cx="4489704" cy="1612669"/>
+          </a:xfrm>
+        </p:spPr>
         <p:txBody>
           <a:bodyPr/>
           <a:lstStyle/>
           <a:p>
-            <a:endParaRPr lang="en-US"/>
-          </a:p>
-        </p:txBody>
-      </p:sp>
-      <p:sp>
-        <p:nvSpPr>
-          <p:cNvPr id="3" name="Picture Placeholder 2" descr="An empty placeholder to add an image. Click on the placeholder and select the image that you wish to add"/>
+            <a:r>
+              <a:rPr lang="en-AU" dirty="0"/>
+              <a:t>A knight must tour a chess board from it's starting position, visiting each location once exactly.</a:t>
+            </a:r>
+            <a:endParaRPr lang="en-US" dirty="0"/>
+          </a:p>
+        </p:txBody>
+      </p:sp>
+      <p:sp>
+        <p:nvSpPr>
+          <p:cNvPr id="5" name="Text Placeholder 4"/>
           <p:cNvSpPr>
             <a:spLocks noGrp="1"/>
           </p:cNvSpPr>
           <p:nvPr>
-            <p:ph type="pic" idx="1"/>
+            <p:ph type="body" sz="quarter" idx="3"/>
           </p:nvPr>
         </p:nvSpPr>
-        <p:spPr/>
+        <p:spPr>
+          <a:xfrm>
+            <a:off x="6419088" y="2269374"/>
+            <a:ext cx="4489704" cy="830695"/>
+          </a:xfrm>
+        </p:spPr>
+        <p:txBody>
+          <a:bodyPr/>
+          <a:lstStyle/>
+          <a:p>
+            <a:r>
+              <a:rPr lang="en-US" dirty="0" smtClean="0"/>
+              <a:t>Quick facts</a:t>
+            </a:r>
+            <a:endParaRPr lang="en-US" dirty="0"/>
+          </a:p>
+        </p:txBody>
+      </p:sp>
+      <p:sp>
+        <p:nvSpPr>
+          <p:cNvPr id="6" name="Content Placeholder 5"/>
+          <p:cNvSpPr>
+            <a:spLocks noGrp="1"/>
+          </p:cNvSpPr>
+          <p:nvPr>
+            <p:ph sz="quarter" idx="4"/>
+          </p:nvPr>
+        </p:nvSpPr>
+        <p:spPr>
+          <a:xfrm>
+            <a:off x="6419088" y="3325085"/>
+            <a:ext cx="4489704" cy="3433769"/>
+          </a:xfrm>
+        </p:spPr>
+        <p:txBody>
+          <a:bodyPr/>
+          <a:lstStyle/>
+          <a:p>
+            <a:r>
+              <a:rPr lang="en-US" dirty="0" smtClean="0"/>
+              <a:t>First reference of the problem was in 9</a:t>
+            </a:r>
+            <a:r>
+              <a:rPr lang="en-US" baseline="30000" dirty="0" smtClean="0"/>
+              <a:t>th</a:t>
+            </a:r>
+            <a:r>
+              <a:rPr lang="en-US" dirty="0" smtClean="0"/>
+              <a:t> century AD.</a:t>
+            </a:r>
+            <a:r>
+              <a:rPr lang="en-US" baseline="30000" dirty="0" smtClean="0"/>
+              <a:t>[1]</a:t>
+            </a:r>
+            <a:endParaRPr lang="en-US" dirty="0" smtClean="0"/>
+          </a:p>
+          <a:p>
+            <a:r>
+              <a:rPr lang="en-AU" dirty="0" smtClean="0"/>
+              <a:t>26,534,728,821,064 directed closed tours on 8 x 8 board.</a:t>
+            </a:r>
+            <a:r>
+              <a:rPr lang="en-AU" baseline="30000" dirty="0" smtClean="0"/>
+              <a:t>[2]</a:t>
+            </a:r>
+            <a:endParaRPr lang="en-AU" dirty="0" smtClean="0"/>
+          </a:p>
+          <a:p>
+            <a:r>
+              <a:rPr lang="en-AU" dirty="0"/>
+              <a:t>4×10</a:t>
+            </a:r>
+            <a:r>
+              <a:rPr lang="en-AU" baseline="30000" dirty="0"/>
+              <a:t>51</a:t>
+            </a:r>
+            <a:r>
+              <a:rPr lang="en-AU" dirty="0"/>
+              <a:t> possible move </a:t>
+            </a:r>
+            <a:r>
+              <a:rPr lang="en-AU" dirty="0" smtClean="0"/>
+              <a:t>sequences on 8x8 board.</a:t>
+            </a:r>
+            <a:r>
+              <a:rPr lang="en-AU" baseline="30000" dirty="0" smtClean="0"/>
+              <a:t>[3]</a:t>
+            </a:r>
+            <a:endParaRPr lang="en-AU" dirty="0" smtClean="0"/>
+          </a:p>
+        </p:txBody>
+      </p:sp>
+      <p:pic>
+        <p:nvPicPr>
+          <p:cNvPr id="1026" name="Picture 2" descr="../_images/knightmoves.png"/>
+          <p:cNvPicPr>
+            <a:picLocks noGrp="1" noChangeAspect="1" noChangeArrowheads="1"/>
+          </p:cNvPicPr>
+          <p:nvPr>
+            <p:ph sz="half" idx="2"/>
+          </p:nvPr>
+        </p:nvPicPr>
+        <p:blipFill>
+          <a:blip r:embed="rId2">
+            <a:extLst>
+              <a:ext uri="{28A0092B-C50C-407E-A947-70E740481C1C}">
+                <a14:useLocalDpi xmlns:a14="http://schemas.microsoft.com/office/drawing/2010/main" val="0"/>
+              </a:ext>
+            </a:extLst>
+          </a:blip>
+          <a:srcRect/>
+          <a:stretch>
+            <a:fillRect/>
+          </a:stretch>
+        </p:blipFill>
+        <p:spPr bwMode="auto">
+          <a:xfrm>
+            <a:off x="1820488" y="4143891"/>
+            <a:ext cx="3291568" cy="1865222"/>
+          </a:xfrm>
+          <a:prstGeom prst="rect">
+            <a:avLst/>
+          </a:prstGeom>
+          <a:noFill/>
+          <a:extLst>
+            <a:ext uri="{909E8E84-426E-40DD-AFC4-6F175D3DCCD1}">
+              <a14:hiddenFill xmlns:a14="http://schemas.microsoft.com/office/drawing/2010/main">
+                <a:solidFill>
+                  <a:srgbClr val="FFFFFF"/>
+                </a:solidFill>
+              </a14:hiddenFill>
+            </a:ext>
+          </a:extLst>
+        </p:spPr>
+      </p:pic>
+      <p:sp>
+        <p:nvSpPr>
+          <p:cNvPr id="8" name="TextBox 7"/>
+          <p:cNvSpPr txBox="1"/>
+          <p:nvPr/>
+        </p:nvSpPr>
+        <p:spPr>
+          <a:xfrm>
+            <a:off x="1762298" y="6003965"/>
+            <a:ext cx="2369128" cy="369332"/>
+          </a:xfrm>
+          <a:prstGeom prst="rect">
+            <a:avLst/>
+          </a:prstGeom>
+          <a:noFill/>
+        </p:spPr>
+        <p:txBody>
+          <a:bodyPr wrap="square" rtlCol="0">
+            <a:spAutoFit/>
+          </a:bodyPr>
+          <a:lstStyle/>
+          <a:p>
+            <a:r>
+              <a:rPr lang="en-AU" sz="600" dirty="0" smtClean="0"/>
+              <a:t>Image from: </a:t>
+            </a:r>
+            <a:r>
+              <a:rPr lang="en-AU" sz="600" dirty="0" smtClean="0">
+                <a:hlinkClick r:id="rId3"/>
+              </a:rPr>
+              <a:t>http</a:t>
+            </a:r>
+            <a:r>
+              <a:rPr lang="en-AU" sz="600" dirty="0">
+                <a:hlinkClick r:id="rId3"/>
+              </a:rPr>
+              <a:t>://</a:t>
+            </a:r>
+            <a:r>
+              <a:rPr lang="en-AU" sz="600" dirty="0" smtClean="0">
+                <a:hlinkClick r:id="rId3"/>
+              </a:rPr>
+              <a:t>interactivepython.org/courselib/static/pythonds/Graphs/BuildingtheKnightsTourGraph.html</a:t>
+            </a:r>
+            <a:r>
+              <a:rPr lang="en-AU" sz="600" dirty="0" smtClean="0"/>
+              <a:t> </a:t>
+            </a:r>
+            <a:endParaRPr lang="en-AU" sz="600" dirty="0"/>
+          </a:p>
+        </p:txBody>
       </p:sp>
     </p:spTree>
     <p:extLst>
       <p:ext uri="{BB962C8B-B14F-4D97-AF65-F5344CB8AC3E}">
-        <p14:creationId xmlns:p14="http://schemas.microsoft.com/office/powerpoint/2010/main" val="87865570"/>
+        <p14:creationId xmlns:p14="http://schemas.microsoft.com/office/powerpoint/2010/main" val="888304381"/>
       </p:ext>
     </p:extLst>
   </p:cSld>
@@ -7476,197 +7610,7 @@
 </p:sld>
 </file>
 
-<file path=ppt/slides/slide11.xml><?xml version="1.0" encoding="utf-8"?>
-<p:sld xmlns:a="http://schemas.openxmlformats.org/drawingml/2006/main" xmlns:r="http://schemas.openxmlformats.org/officeDocument/2006/relationships" xmlns:p="http://schemas.openxmlformats.org/presentationml/2006/main">
-  <p:cSld>
-    <p:spTree>
-      <p:nvGrpSpPr>
-        <p:cNvPr id="1" name=""/>
-        <p:cNvGrpSpPr/>
-        <p:nvPr/>
-      </p:nvGrpSpPr>
-      <p:grpSpPr>
-        <a:xfrm>
-          <a:off x="0" y="0"/>
-          <a:ext cx="0" cy="0"/>
-          <a:chOff x="0" y="0"/>
-          <a:chExt cx="0" cy="0"/>
-        </a:xfrm>
-      </p:grpSpPr>
-      <p:sp>
-        <p:nvSpPr>
-          <p:cNvPr id="2" name="Title 1"/>
-          <p:cNvSpPr>
-            <a:spLocks noGrp="1"/>
-          </p:cNvSpPr>
-          <p:nvPr>
-            <p:ph type="title"/>
-          </p:nvPr>
-        </p:nvSpPr>
-        <p:spPr/>
-        <p:txBody>
-          <a:bodyPr/>
-          <a:lstStyle/>
-          <a:p>
-            <a:r>
-              <a:rPr lang="en-US" dirty="0"/>
-              <a:t>Add a Slide Title - 5</a:t>
-            </a:r>
-          </a:p>
-        </p:txBody>
-      </p:sp>
-      <p:sp>
-        <p:nvSpPr>
-          <p:cNvPr id="4" name="Text Placeholder 3"/>
-          <p:cNvSpPr>
-            <a:spLocks noGrp="1"/>
-          </p:cNvSpPr>
-          <p:nvPr>
-            <p:ph type="body" sz="half" idx="2"/>
-          </p:nvPr>
-        </p:nvSpPr>
-        <p:spPr/>
-        <p:txBody>
-          <a:bodyPr/>
-          <a:lstStyle/>
-          <a:p>
-            <a:endParaRPr lang="en-US"/>
-          </a:p>
-        </p:txBody>
-      </p:sp>
-      <p:sp>
-        <p:nvSpPr>
-          <p:cNvPr id="3" name="Picture Placeholder 2" descr="An empty placeholder to add an image. Click on the placeholder and select the image that you wish to add"/>
-          <p:cNvSpPr>
-            <a:spLocks noGrp="1"/>
-          </p:cNvSpPr>
-          <p:nvPr>
-            <p:ph type="pic" idx="1"/>
-          </p:nvPr>
-        </p:nvSpPr>
-        <p:spPr/>
-      </p:sp>
-    </p:spTree>
-    <p:extLst>
-      <p:ext uri="{BB962C8B-B14F-4D97-AF65-F5344CB8AC3E}">
-        <p14:creationId xmlns:p14="http://schemas.microsoft.com/office/powerpoint/2010/main" val="158095033"/>
-      </p:ext>
-    </p:extLst>
-  </p:cSld>
-  <p:clrMapOvr>
-    <a:masterClrMapping/>
-  </p:clrMapOvr>
-  <mc:AlternateContent xmlns:mc="http://schemas.openxmlformats.org/markup-compatibility/2006" xmlns:p14="http://schemas.microsoft.com/office/powerpoint/2010/main">
-    <mc:Choice Requires="p14">
-      <p:transition spd="med" p14:dur="700">
-        <p:fade/>
-      </p:transition>
-    </mc:Choice>
-    <mc:Fallback xmlns="">
-      <p:transition spd="med">
-        <p:fade/>
-      </p:transition>
-    </mc:Fallback>
-  </mc:AlternateContent>
-</p:sld>
-</file>
-
-<file path=ppt/slides/slide12.xml><?xml version="1.0" encoding="utf-8"?>
-<p:sld xmlns:a="http://schemas.openxmlformats.org/drawingml/2006/main" xmlns:r="http://schemas.openxmlformats.org/officeDocument/2006/relationships" xmlns:p="http://schemas.openxmlformats.org/presentationml/2006/main">
-  <p:cSld>
-    <p:spTree>
-      <p:nvGrpSpPr>
-        <p:cNvPr id="1" name=""/>
-        <p:cNvGrpSpPr/>
-        <p:nvPr/>
-      </p:nvGrpSpPr>
-      <p:grpSpPr>
-        <a:xfrm>
-          <a:off x="0" y="0"/>
-          <a:ext cx="0" cy="0"/>
-          <a:chOff x="0" y="0"/>
-          <a:chExt cx="0" cy="0"/>
-        </a:xfrm>
-      </p:grpSpPr>
-      <p:sp>
-        <p:nvSpPr>
-          <p:cNvPr id="2" name="Title 1"/>
-          <p:cNvSpPr>
-            <a:spLocks noGrp="1"/>
-          </p:cNvSpPr>
-          <p:nvPr>
-            <p:ph type="title"/>
-          </p:nvPr>
-        </p:nvSpPr>
-        <p:spPr/>
-        <p:txBody>
-          <a:bodyPr/>
-          <a:lstStyle/>
-          <a:p>
-            <a:r>
-              <a:rPr lang="en-US" dirty="0"/>
-              <a:t>Add a Slide Title - 5</a:t>
-            </a:r>
-          </a:p>
-        </p:txBody>
-      </p:sp>
-      <p:sp>
-        <p:nvSpPr>
-          <p:cNvPr id="4" name="Text Placeholder 3"/>
-          <p:cNvSpPr>
-            <a:spLocks noGrp="1"/>
-          </p:cNvSpPr>
-          <p:nvPr>
-            <p:ph type="body" sz="half" idx="2"/>
-          </p:nvPr>
-        </p:nvSpPr>
-        <p:spPr/>
-        <p:txBody>
-          <a:bodyPr/>
-          <a:lstStyle/>
-          <a:p>
-            <a:endParaRPr lang="en-US"/>
-          </a:p>
-        </p:txBody>
-      </p:sp>
-      <p:sp>
-        <p:nvSpPr>
-          <p:cNvPr id="3" name="Picture Placeholder 2" descr="An empty placeholder to add an image. Click on the placeholder and select the image that you wish to add"/>
-          <p:cNvSpPr>
-            <a:spLocks noGrp="1"/>
-          </p:cNvSpPr>
-          <p:nvPr>
-            <p:ph type="pic" idx="1"/>
-          </p:nvPr>
-        </p:nvSpPr>
-        <p:spPr/>
-      </p:sp>
-    </p:spTree>
-    <p:extLst>
-      <p:ext uri="{BB962C8B-B14F-4D97-AF65-F5344CB8AC3E}">
-        <p14:creationId xmlns:p14="http://schemas.microsoft.com/office/powerpoint/2010/main" val="219409804"/>
-      </p:ext>
-    </p:extLst>
-  </p:cSld>
-  <p:clrMapOvr>
-    <a:masterClrMapping/>
-  </p:clrMapOvr>
-  <mc:AlternateContent xmlns:mc="http://schemas.openxmlformats.org/markup-compatibility/2006" xmlns:p14="http://schemas.microsoft.com/office/powerpoint/2010/main">
-    <mc:Choice Requires="p14">
-      <p:transition spd="med" p14:dur="700">
-        <p:fade/>
-      </p:transition>
-    </mc:Choice>
-    <mc:Fallback xmlns="">
-      <p:transition spd="med">
-        <p:fade/>
-      </p:transition>
-    </mc:Fallback>
-  </mc:AlternateContent>
-</p:sld>
-</file>
-
-<file path=ppt/slides/slide2.xml><?xml version="1.0" encoding="utf-8"?>
+<file path=ppt/slides/slide3.xml><?xml version="1.0" encoding="utf-8"?>
 <p:sld xmlns:a="http://schemas.openxmlformats.org/drawingml/2006/main" xmlns:r="http://schemas.openxmlformats.org/officeDocument/2006/relationships" xmlns:p="http://schemas.openxmlformats.org/presentationml/2006/main">
   <p:cSld>
     <p:spTree>
@@ -8203,7 +8147,7 @@
 </p:sld>
 </file>
 
-<file path=ppt/slides/slide3.xml><?xml version="1.0" encoding="utf-8"?>
+<file path=ppt/slides/slide4.xml><?xml version="1.0" encoding="utf-8"?>
 <p:sld xmlns:a="http://schemas.openxmlformats.org/drawingml/2006/main" xmlns:r="http://schemas.openxmlformats.org/officeDocument/2006/relationships" xmlns:p="http://schemas.openxmlformats.org/presentationml/2006/main">
   <p:cSld>
     <p:spTree>
@@ -8237,7 +8181,7 @@
           <a:p>
             <a:r>
               <a:rPr lang="en-US" dirty="0" smtClean="0"/>
-              <a:t>The Knight’s tour problem</a:t>
+              <a:t>Solution Challenges</a:t>
             </a:r>
             <a:endParaRPr lang="en-US" dirty="0"/>
           </a:p>
@@ -8245,208 +8189,108 @@
       </p:sp>
       <p:sp>
         <p:nvSpPr>
-          <p:cNvPr id="3" name="Text Placeholder 2"/>
+          <p:cNvPr id="4" name="Text Placeholder 3"/>
           <p:cNvSpPr>
             <a:spLocks noGrp="1"/>
           </p:cNvSpPr>
           <p:nvPr>
-            <p:ph type="body" idx="1"/>
+            <p:ph type="body" sz="half" idx="2"/>
           </p:nvPr>
         </p:nvSpPr>
         <p:spPr>
           <a:xfrm>
-            <a:off x="1280160" y="1828456"/>
-            <a:ext cx="4489704" cy="2494162"/>
+            <a:off x="1291818" y="2465293"/>
+            <a:ext cx="8350945" cy="3711669"/>
           </a:xfrm>
         </p:spPr>
         <p:txBody>
-          <a:bodyPr/>
-          <a:lstStyle/>
-          <a:p>
-            <a:r>
-              <a:rPr lang="en-US" dirty="0" smtClean="0"/>
-              <a:t>Explanation of knights tour goes here</a:t>
-            </a:r>
-            <a:endParaRPr lang="en-US" dirty="0"/>
-          </a:p>
-        </p:txBody>
-      </p:sp>
-      <p:sp>
-        <p:nvSpPr>
-          <p:cNvPr id="5" name="Text Placeholder 4"/>
-          <p:cNvSpPr>
-            <a:spLocks noGrp="1"/>
-          </p:cNvSpPr>
-          <p:nvPr>
-            <p:ph type="body" sz="quarter" idx="3"/>
-          </p:nvPr>
-        </p:nvSpPr>
-        <p:spPr/>
-        <p:txBody>
-          <a:bodyPr/>
-          <a:lstStyle/>
-          <a:p>
-            <a:r>
-              <a:rPr lang="en-US" dirty="0" smtClean="0"/>
-              <a:t>Quick facts</a:t>
-            </a:r>
-            <a:endParaRPr lang="en-US" dirty="0"/>
-          </a:p>
-        </p:txBody>
-      </p:sp>
-      <p:sp>
-        <p:nvSpPr>
-          <p:cNvPr id="6" name="Content Placeholder 5"/>
-          <p:cNvSpPr>
-            <a:spLocks noGrp="1"/>
-          </p:cNvSpPr>
-          <p:nvPr>
-            <p:ph sz="quarter" idx="4"/>
-          </p:nvPr>
-        </p:nvSpPr>
-        <p:spPr/>
-        <p:txBody>
-          <a:bodyPr/>
-          <a:lstStyle/>
-          <a:p>
-            <a:r>
-              <a:rPr lang="en-US" dirty="0" smtClean="0"/>
-              <a:t>First reference of the problem was in 9</a:t>
-            </a:r>
-            <a:r>
-              <a:rPr lang="en-US" baseline="30000" dirty="0" smtClean="0"/>
-              <a:t>th</a:t>
-            </a:r>
-            <a:r>
-              <a:rPr lang="en-US" dirty="0" smtClean="0"/>
-              <a:t> century AD</a:t>
-            </a:r>
-          </a:p>
-          <a:p>
-            <a:r>
-              <a:rPr lang="en-AU" dirty="0" smtClean="0"/>
-              <a:t>26,534,728,821,064 directed closed tours on 8 x 8 board</a:t>
-            </a:r>
-          </a:p>
-          <a:p>
-            <a:r>
-              <a:rPr lang="en-AU" dirty="0"/>
-              <a:t>4×10</a:t>
-            </a:r>
-            <a:r>
-              <a:rPr lang="en-AU" baseline="30000" dirty="0"/>
-              <a:t>51</a:t>
-            </a:r>
-            <a:r>
-              <a:rPr lang="en-AU" dirty="0"/>
-              <a:t> possible move </a:t>
-            </a:r>
-            <a:r>
-              <a:rPr lang="en-AU" dirty="0" smtClean="0"/>
-              <a:t>sequences on 8x8 board</a:t>
-            </a:r>
-          </a:p>
-        </p:txBody>
-      </p:sp>
-      <p:pic>
-        <p:nvPicPr>
-          <p:cNvPr id="1026" name="Picture 2" descr="../_images/knightmoves.png"/>
-          <p:cNvPicPr>
-            <a:picLocks noGrp="1" noChangeAspect="1" noChangeArrowheads="1"/>
-          </p:cNvPicPr>
-          <p:nvPr>
-            <p:ph sz="half" idx="2"/>
-          </p:nvPr>
-        </p:nvPicPr>
-        <p:blipFill>
-          <a:blip r:embed="rId2">
-            <a:extLst>
-              <a:ext uri="{28A0092B-C50C-407E-A947-70E740481C1C}">
-                <a14:useLocalDpi xmlns:a14="http://schemas.microsoft.com/office/drawing/2010/main" val="0"/>
-              </a:ext>
-            </a:extLst>
-          </a:blip>
-          <a:srcRect/>
-          <a:stretch>
-            <a:fillRect/>
-          </a:stretch>
-        </p:blipFill>
-        <p:spPr bwMode="auto">
-          <a:xfrm>
-            <a:off x="1280160" y="4405740"/>
-            <a:ext cx="3291568" cy="1865222"/>
-          </a:xfrm>
-          <a:prstGeom prst="rect">
-            <a:avLst/>
-          </a:prstGeom>
-          <a:noFill/>
-          <a:extLst>
-            <a:ext uri="{909E8E84-426E-40DD-AFC4-6F175D3DCCD1}">
-              <a14:hiddenFill xmlns:a14="http://schemas.microsoft.com/office/drawing/2010/main">
-                <a:solidFill>
-                  <a:srgbClr val="FFFFFF"/>
-                </a:solidFill>
-              </a14:hiddenFill>
-            </a:ext>
-          </a:extLst>
-        </p:spPr>
-      </p:pic>
-      <p:sp>
-        <p:nvSpPr>
-          <p:cNvPr id="8" name="TextBox 7"/>
-          <p:cNvSpPr txBox="1"/>
-          <p:nvPr/>
-        </p:nvSpPr>
-        <p:spPr>
-          <a:xfrm>
-            <a:off x="1280160" y="6270962"/>
-            <a:ext cx="2369128" cy="369332"/>
-          </a:xfrm>
-          <a:prstGeom prst="rect">
-            <a:avLst/>
-          </a:prstGeom>
-          <a:noFill/>
-        </p:spPr>
-        <p:txBody>
-          <a:bodyPr wrap="square" rtlCol="0">
-            <a:spAutoFit/>
+          <a:bodyPr>
+            <a:normAutofit/>
           </a:bodyPr>
           <a:lstStyle/>
           <a:p>
-            <a:r>
-              <a:rPr lang="en-AU" sz="600" dirty="0" smtClean="0"/>
-              <a:t>Image from: </a:t>
-            </a:r>
-            <a:r>
-              <a:rPr lang="en-AU" sz="600" dirty="0" smtClean="0">
-                <a:hlinkClick r:id="rId3"/>
-              </a:rPr>
-              <a:t>http</a:t>
-            </a:r>
-            <a:r>
-              <a:rPr lang="en-AU" sz="600" dirty="0">
-                <a:hlinkClick r:id="rId3"/>
-              </a:rPr>
-              <a:t>://</a:t>
-            </a:r>
-            <a:r>
-              <a:rPr lang="en-AU" sz="600" dirty="0" smtClean="0">
-                <a:hlinkClick r:id="rId3"/>
-              </a:rPr>
-              <a:t>interactivepython.org/courselib/static/pythonds/Graphs/BuildingtheKnightsTourGraph.html</a:t>
-            </a:r>
-            <a:r>
-              <a:rPr lang="en-AU" sz="600" dirty="0" smtClean="0"/>
-              <a:t> </a:t>
-            </a:r>
-            <a:endParaRPr lang="en-AU" sz="600" dirty="0"/>
+            <a:pPr marL="342900" indent="-342900">
+              <a:buFont typeface="Wingdings" panose="05000000000000000000" pitchFamily="2" charset="2"/>
+              <a:buChar char="§"/>
+            </a:pPr>
+            <a:r>
+              <a:rPr lang="en-AU" dirty="0"/>
+              <a:t>H</a:t>
+            </a:r>
+            <a:r>
+              <a:rPr lang="en-AU" dirty="0" smtClean="0"/>
+              <a:t>ow </a:t>
+            </a:r>
+            <a:r>
+              <a:rPr lang="en-AU" dirty="0"/>
+              <a:t>to represent the problem so we can apply an algorithm</a:t>
+            </a:r>
+            <a:r>
+              <a:rPr lang="en-AU" dirty="0" smtClean="0"/>
+              <a:t>?</a:t>
+            </a:r>
+          </a:p>
+          <a:p>
+            <a:pPr marL="342900" indent="-342900">
+              <a:buFont typeface="Wingdings" panose="05000000000000000000" pitchFamily="2" charset="2"/>
+              <a:buChar char="§"/>
+            </a:pPr>
+            <a:endParaRPr lang="en-AU" dirty="0" smtClean="0"/>
+          </a:p>
+          <a:p>
+            <a:pPr marL="342900" indent="-342900">
+              <a:buFont typeface="Wingdings" panose="05000000000000000000" pitchFamily="2" charset="2"/>
+              <a:buChar char="§"/>
+            </a:pPr>
+            <a:r>
+              <a:rPr lang="en-AU" dirty="0" smtClean="0"/>
+              <a:t>Difficult to </a:t>
+            </a:r>
+            <a:r>
+              <a:rPr lang="en-AU" dirty="0"/>
+              <a:t>make </a:t>
+            </a:r>
+            <a:r>
+              <a:rPr lang="en-AU" dirty="0" smtClean="0"/>
+              <a:t>the boards </a:t>
+            </a:r>
+            <a:r>
+              <a:rPr lang="en-AU" dirty="0"/>
+              <a:t>state and past moves computationally </a:t>
+            </a:r>
+            <a:r>
+              <a:rPr lang="en-AU" dirty="0" smtClean="0"/>
+              <a:t>efficient</a:t>
+            </a:r>
+          </a:p>
+          <a:p>
+            <a:pPr marL="342900" indent="-342900">
+              <a:buFont typeface="Wingdings" panose="05000000000000000000" pitchFamily="2" charset="2"/>
+              <a:buChar char="§"/>
+            </a:pPr>
+            <a:endParaRPr lang="en-AU" dirty="0" smtClean="0"/>
+          </a:p>
+          <a:p>
+            <a:pPr marL="342900" indent="-342900">
+              <a:buFont typeface="Wingdings" panose="05000000000000000000" pitchFamily="2" charset="2"/>
+              <a:buChar char="§"/>
+            </a:pPr>
+            <a:r>
+              <a:rPr lang="en-AU" dirty="0" smtClean="0"/>
+              <a:t>Very </a:t>
+            </a:r>
+            <a:r>
+              <a:rPr lang="en-AU" dirty="0"/>
+              <a:t>large state space, brute force with uninformed search becomes impractical very quickly</a:t>
+            </a:r>
+            <a:endParaRPr lang="en-US" dirty="0"/>
           </a:p>
         </p:txBody>
       </p:sp>
     </p:spTree>
     <p:extLst>
       <p:ext uri="{BB962C8B-B14F-4D97-AF65-F5344CB8AC3E}">
-        <p14:creationId xmlns:p14="http://schemas.microsoft.com/office/powerpoint/2010/main" val="888304381"/>
+        <p14:creationId xmlns:p14="http://schemas.microsoft.com/office/powerpoint/2010/main" val="3734198996"/>
       </p:ext>
     </p:extLst>
   </p:cSld>
@@ -8468,7 +8312,7 @@
 </p:sld>
 </file>
 
-<file path=ppt/slides/slide4.xml><?xml version="1.0" encoding="utf-8"?>
+<file path=ppt/slides/slide5.xml><?xml version="1.0" encoding="utf-8"?>
 <p:sld xmlns:a="http://schemas.openxmlformats.org/drawingml/2006/main" xmlns:r="http://schemas.openxmlformats.org/officeDocument/2006/relationships" xmlns:p="http://schemas.openxmlformats.org/presentationml/2006/main">
   <p:cSld>
     <p:spTree>
@@ -8518,7 +8362,7 @@
             <p:ph idx="1"/>
             <p:extLst>
               <p:ext uri="{D42A27DB-BD31-4B8C-83A1-F6EECF244321}">
-                <p14:modId xmlns:p14="http://schemas.microsoft.com/office/powerpoint/2010/main" val="1180906044"/>
+                <p14:modId xmlns:p14="http://schemas.microsoft.com/office/powerpoint/2010/main" val="1265925412"/>
               </p:ext>
             </p:extLst>
           </p:nvPr>
@@ -8558,127 +8402,6 @@
 </p:sld>
 </file>
 
-<file path=ppt/slides/slide5.xml><?xml version="1.0" encoding="utf-8"?>
-<p:sld xmlns:a="http://schemas.openxmlformats.org/drawingml/2006/main" xmlns:r="http://schemas.openxmlformats.org/officeDocument/2006/relationships" xmlns:p="http://schemas.openxmlformats.org/presentationml/2006/main">
-  <p:cSld>
-    <p:spTree>
-      <p:nvGrpSpPr>
-        <p:cNvPr id="1" name=""/>
-        <p:cNvGrpSpPr/>
-        <p:nvPr/>
-      </p:nvGrpSpPr>
-      <p:grpSpPr>
-        <a:xfrm>
-          <a:off x="0" y="0"/>
-          <a:ext cx="0" cy="0"/>
-          <a:chOff x="0" y="0"/>
-          <a:chExt cx="0" cy="0"/>
-        </a:xfrm>
-      </p:grpSpPr>
-      <p:sp>
-        <p:nvSpPr>
-          <p:cNvPr id="2" name="Title 1"/>
-          <p:cNvSpPr>
-            <a:spLocks noGrp="1"/>
-          </p:cNvSpPr>
-          <p:nvPr>
-            <p:ph type="title"/>
-          </p:nvPr>
-        </p:nvSpPr>
-        <p:spPr/>
-        <p:txBody>
-          <a:bodyPr/>
-          <a:lstStyle/>
-          <a:p>
-            <a:r>
-              <a:rPr lang="en-US" dirty="0" smtClean="0"/>
-              <a:t>Demonstration</a:t>
-            </a:r>
-            <a:endParaRPr lang="en-US" dirty="0"/>
-          </a:p>
-        </p:txBody>
-      </p:sp>
-      <p:sp>
-        <p:nvSpPr>
-          <p:cNvPr id="3" name="TextBox 2"/>
-          <p:cNvSpPr txBox="1">
-            <a:spLocks/>
-          </p:cNvSpPr>
-          <p:nvPr/>
-        </p:nvSpPr>
-        <p:spPr>
-          <a:xfrm>
-            <a:off x="1914525" y="2324099"/>
-            <a:ext cx="8753475" cy="4190400"/>
-          </a:xfrm>
-          <a:prstGeom prst="rect">
-            <a:avLst/>
-          </a:prstGeom>
-          <a:noFill/>
-        </p:spPr>
-        <p:txBody>
-          <a:bodyPr wrap="square" rtlCol="0">
-            <a:spAutoFit/>
-          </a:bodyPr>
-          <a:lstStyle/>
-          <a:p>
-            <a:pPr algn="ctr"/>
-            <a:endParaRPr lang="en-AU" dirty="0" smtClean="0"/>
-          </a:p>
-          <a:p>
-            <a:pPr algn="ctr"/>
-            <a:endParaRPr lang="en-AU" dirty="0"/>
-          </a:p>
-          <a:p>
-            <a:pPr algn="ctr"/>
-            <a:endParaRPr lang="en-AU" dirty="0" smtClean="0"/>
-          </a:p>
-          <a:p>
-            <a:pPr algn="ctr"/>
-            <a:endParaRPr lang="en-AU" dirty="0"/>
-          </a:p>
-          <a:p>
-            <a:pPr algn="ctr"/>
-            <a:endParaRPr lang="en-AU" dirty="0" smtClean="0"/>
-          </a:p>
-          <a:p>
-            <a:pPr algn="ctr"/>
-            <a:endParaRPr lang="en-AU" dirty="0"/>
-          </a:p>
-          <a:p>
-            <a:pPr algn="ctr"/>
-            <a:r>
-              <a:rPr lang="en-AU" dirty="0" smtClean="0"/>
-              <a:t>Demonstration goes here</a:t>
-            </a:r>
-          </a:p>
-        </p:txBody>
-      </p:sp>
-    </p:spTree>
-    <p:extLst>
-      <p:ext uri="{BB962C8B-B14F-4D97-AF65-F5344CB8AC3E}">
-        <p14:creationId xmlns:p14="http://schemas.microsoft.com/office/powerpoint/2010/main" val="2902466307"/>
-      </p:ext>
-    </p:extLst>
-  </p:cSld>
-  <p:clrMapOvr>
-    <a:masterClrMapping/>
-  </p:clrMapOvr>
-  <mc:AlternateContent xmlns:mc="http://schemas.openxmlformats.org/markup-compatibility/2006" xmlns:p14="http://schemas.microsoft.com/office/powerpoint/2010/main">
-    <mc:Choice Requires="p14">
-      <p:transition spd="med" p14:dur="700">
-        <p:fade/>
-      </p:transition>
-    </mc:Choice>
-    <mc:Fallback xmlns="">
-      <p:transition spd="med">
-        <p:fade/>
-      </p:transition>
-    </mc:Fallback>
-  </mc:AlternateContent>
-</p:sld>
-</file>
-
 <file path=ppt/slides/slide6.xml><?xml version="1.0" encoding="utf-8"?>
 <p:sld xmlns:a="http://schemas.openxmlformats.org/drawingml/2006/main" xmlns:r="http://schemas.openxmlformats.org/officeDocument/2006/relationships" xmlns:p="http://schemas.openxmlformats.org/presentationml/2006/main">
   <p:cSld>
@@ -8713,7 +8436,7 @@
           <a:p>
             <a:r>
               <a:rPr lang="en-US" dirty="0" smtClean="0"/>
-              <a:t>Limitations and constraints</a:t>
+              <a:t>Demonstration</a:t>
             </a:r>
             <a:endParaRPr lang="en-US" dirty="0"/>
           </a:p>
@@ -8721,65 +8444,64 @@
       </p:sp>
       <p:sp>
         <p:nvSpPr>
-          <p:cNvPr id="4" name="Text Placeholder 3"/>
-          <p:cNvSpPr>
-            <a:spLocks noGrp="1"/>
+          <p:cNvPr id="3" name="TextBox 2"/>
+          <p:cNvSpPr txBox="1">
+            <a:spLocks/>
           </p:cNvSpPr>
-          <p:nvPr>
-            <p:ph type="body" sz="half" idx="2"/>
-          </p:nvPr>
-        </p:nvSpPr>
-        <p:spPr/>
-        <p:txBody>
-          <a:bodyPr/>
+          <p:nvPr/>
+        </p:nvSpPr>
+        <p:spPr>
+          <a:xfrm>
+            <a:off x="1914525" y="2324099"/>
+            <a:ext cx="8753475" cy="4190400"/>
+          </a:xfrm>
+          <a:prstGeom prst="rect">
+            <a:avLst/>
+          </a:prstGeom>
+          <a:noFill/>
+        </p:spPr>
+        <p:txBody>
+          <a:bodyPr wrap="square" rtlCol="0">
+            <a:spAutoFit/>
+          </a:bodyPr>
           <a:lstStyle/>
           <a:p>
-            <a:r>
-              <a:rPr lang="en-US" dirty="0" smtClean="0"/>
-              <a:t>No test cases for bugs when solver doesn’t find solution</a:t>
-            </a:r>
-          </a:p>
-          <a:p>
-            <a:endParaRPr lang="en-US" dirty="0"/>
-          </a:p>
-          <a:p>
-            <a:endParaRPr lang="en-US" dirty="0"/>
-          </a:p>
-        </p:txBody>
-      </p:sp>
-      <p:sp>
-        <p:nvSpPr>
-          <p:cNvPr id="3" name="Content Placeholder 2"/>
-          <p:cNvSpPr>
-            <a:spLocks noGrp="1"/>
-          </p:cNvSpPr>
-          <p:nvPr>
-            <p:ph idx="1"/>
-          </p:nvPr>
-        </p:nvSpPr>
-        <p:spPr/>
-        <p:txBody>
-          <a:bodyPr/>
-          <a:lstStyle/>
-          <a:p>
-            <a:r>
-              <a:rPr lang="en-US" dirty="0" smtClean="0"/>
-              <a:t>In the tests we ran it found a solution very quickly on most boards</a:t>
-            </a:r>
-          </a:p>
-          <a:p>
-            <a:r>
-              <a:rPr lang="en-US" dirty="0" smtClean="0"/>
-              <a:t>Would add test cases if needed to enhance the program</a:t>
-            </a:r>
-            <a:endParaRPr lang="en-US" dirty="0"/>
+            <a:pPr algn="ctr"/>
+            <a:endParaRPr lang="en-AU" dirty="0" smtClean="0"/>
+          </a:p>
+          <a:p>
+            <a:pPr algn="ctr"/>
+            <a:endParaRPr lang="en-AU" dirty="0"/>
+          </a:p>
+          <a:p>
+            <a:pPr algn="ctr"/>
+            <a:endParaRPr lang="en-AU" dirty="0" smtClean="0"/>
+          </a:p>
+          <a:p>
+            <a:pPr algn="ctr"/>
+            <a:endParaRPr lang="en-AU" dirty="0"/>
+          </a:p>
+          <a:p>
+            <a:pPr algn="ctr"/>
+            <a:endParaRPr lang="en-AU" dirty="0" smtClean="0"/>
+          </a:p>
+          <a:p>
+            <a:pPr algn="ctr"/>
+            <a:endParaRPr lang="en-AU" dirty="0"/>
+          </a:p>
+          <a:p>
+            <a:pPr algn="ctr"/>
+            <a:r>
+              <a:rPr lang="en-AU" dirty="0" smtClean="0"/>
+              <a:t>Demonstration goes here</a:t>
+            </a:r>
           </a:p>
         </p:txBody>
       </p:sp>
     </p:spTree>
     <p:extLst>
       <p:ext uri="{BB962C8B-B14F-4D97-AF65-F5344CB8AC3E}">
-        <p14:creationId xmlns:p14="http://schemas.microsoft.com/office/powerpoint/2010/main" val="1457430339"/>
+        <p14:creationId xmlns:p14="http://schemas.microsoft.com/office/powerpoint/2010/main" val="2902466307"/>
       </p:ext>
     </p:extLst>
   </p:cSld>
@@ -8820,7 +8542,7 @@
       </p:grpSpPr>
       <p:sp>
         <p:nvSpPr>
-          <p:cNvPr id="13" name="Title 1"/>
+          <p:cNvPr id="2" name="Title 1"/>
           <p:cNvSpPr>
             <a:spLocks noGrp="1"/>
           </p:cNvSpPr>
@@ -8835,7 +8557,7 @@
           <a:p>
             <a:r>
               <a:rPr lang="en-US" dirty="0" smtClean="0"/>
-              <a:t>Requirements</a:t>
+              <a:t>Limitations and constraints</a:t>
             </a:r>
             <a:endParaRPr lang="en-US" dirty="0"/>
           </a:p>
@@ -8843,7 +8565,50 @@
       </p:sp>
       <p:sp>
         <p:nvSpPr>
-          <p:cNvPr id="14" name="Content Placeholder 2"/>
+          <p:cNvPr id="4" name="Text Placeholder 3"/>
+          <p:cNvSpPr>
+            <a:spLocks noGrp="1"/>
+          </p:cNvSpPr>
+          <p:nvPr>
+            <p:ph type="body" sz="half" idx="2"/>
+          </p:nvPr>
+        </p:nvSpPr>
+        <p:spPr/>
+        <p:txBody>
+          <a:bodyPr>
+            <a:normAutofit fontScale="92500" lnSpcReduction="10000"/>
+          </a:bodyPr>
+          <a:lstStyle/>
+          <a:p>
+            <a:r>
+              <a:rPr lang="en-US" dirty="0" smtClean="0"/>
+              <a:t>No test cases for bugs when solver doesn’t find solution</a:t>
+            </a:r>
+          </a:p>
+          <a:p>
+            <a:endParaRPr lang="en-US" dirty="0"/>
+          </a:p>
+          <a:p>
+            <a:endParaRPr lang="en-US" dirty="0" smtClean="0"/>
+          </a:p>
+          <a:p>
+            <a:endParaRPr lang="en-US" dirty="0"/>
+          </a:p>
+          <a:p>
+            <a:endParaRPr lang="en-US" dirty="0" smtClean="0"/>
+          </a:p>
+          <a:p>
+            <a:r>
+              <a:rPr lang="en-US" dirty="0" smtClean="0"/>
+              <a:t>Depth-first search is too slow to be practical for boards larger than 5 x 5 or 6 x 6</a:t>
+            </a:r>
+            <a:endParaRPr lang="en-US" dirty="0"/>
+          </a:p>
+        </p:txBody>
+      </p:sp>
+      <p:sp>
+        <p:nvSpPr>
+          <p:cNvPr id="3" name="Content Placeholder 2"/>
           <p:cNvSpPr>
             <a:spLocks noGrp="1"/>
           </p:cNvSpPr>
@@ -8853,53 +8618,41 @@
         </p:nvSpPr>
         <p:spPr/>
         <p:txBody>
-          <a:bodyPr/>
+          <a:bodyPr>
+            <a:normAutofit/>
+          </a:bodyPr>
           <a:lstStyle/>
           <a:p>
             <a:r>
-              <a:rPr lang="en-AU" dirty="0"/>
-              <a:t>1) Explanation of the Knight’s Tour problem, and what makes it challenging to solve</a:t>
-            </a:r>
-          </a:p>
-          <a:p>
-            <a:r>
-              <a:rPr lang="en-AU" dirty="0"/>
-              <a:t>2) Explanation of the solution algorithm you chose or designed</a:t>
-            </a:r>
-          </a:p>
-          <a:p>
-            <a:r>
-              <a:rPr lang="en-AU" dirty="0"/>
-              <a:t>3) Explanation and demonstration of your software implementation of this algorithm</a:t>
-            </a:r>
-          </a:p>
-          <a:p>
-            <a:r>
-              <a:rPr lang="en-AU" dirty="0"/>
-              <a:t>4) Discussion of any limitations or constraints of your solution</a:t>
-            </a:r>
-          </a:p>
-          <a:p>
-            <a:r>
-              <a:rPr lang="en-AU" dirty="0"/>
-              <a:t>5) You must also clearly identify </a:t>
-            </a:r>
-            <a:r>
-              <a:rPr lang="en-AU" dirty="0" smtClean="0"/>
-              <a:t>which group </a:t>
-            </a:r>
-            <a:r>
-              <a:rPr lang="en-AU" dirty="0"/>
-              <a:t>members did what work, to contribute to the solution</a:t>
-            </a:r>
-            <a:endParaRPr lang="en-US" dirty="0"/>
+              <a:rPr lang="en-US" sz="2000" dirty="0" smtClean="0"/>
+              <a:t>In the tests we ran it found a solution very quickly on most boards</a:t>
+            </a:r>
+          </a:p>
+          <a:p>
+            <a:r>
+              <a:rPr lang="en-US" sz="2000" dirty="0" smtClean="0"/>
+              <a:t>Would add test cases if needed to enhance the program</a:t>
+            </a:r>
+          </a:p>
+          <a:p>
+            <a:endParaRPr lang="en-US" sz="2000" dirty="0"/>
+          </a:p>
+          <a:p>
+            <a:endParaRPr lang="en-US" sz="2000" dirty="0" smtClean="0"/>
+          </a:p>
+          <a:p>
+            <a:r>
+              <a:rPr lang="en-US" sz="2000" dirty="0" smtClean="0"/>
+              <a:t>Warnsdorff’s rule helps alleviate this</a:t>
+            </a:r>
+            <a:endParaRPr lang="en-US" sz="2000" dirty="0"/>
           </a:p>
         </p:txBody>
       </p:sp>
     </p:spTree>
     <p:extLst>
       <p:ext uri="{BB962C8B-B14F-4D97-AF65-F5344CB8AC3E}">
-        <p14:creationId xmlns:p14="http://schemas.microsoft.com/office/powerpoint/2010/main" val="1440355687"/>
+        <p14:creationId xmlns:p14="http://schemas.microsoft.com/office/powerpoint/2010/main" val="1457430339"/>
       </p:ext>
     </p:extLst>
   </p:cSld>
@@ -8954,9 +8707,10 @@
           <a:lstStyle/>
           <a:p>
             <a:r>
-              <a:rPr lang="en-US" dirty="0"/>
-              <a:t>Add a Slide Title - 5</a:t>
-            </a:r>
+              <a:rPr lang="en-US" dirty="0" smtClean="0"/>
+              <a:t>References</a:t>
+            </a:r>
+            <a:endParaRPr lang="en-US" dirty="0"/>
           </a:p>
         </p:txBody>
       </p:sp>
@@ -8970,31 +8724,102 @@
             <p:ph type="body" sz="half" idx="2"/>
           </p:nvPr>
         </p:nvSpPr>
-        <p:spPr/>
+        <p:spPr>
+          <a:xfrm>
+            <a:off x="1291818" y="2465293"/>
+            <a:ext cx="7394981" cy="3711669"/>
+          </a:xfrm>
+        </p:spPr>
         <p:txBody>
           <a:bodyPr/>
           <a:lstStyle/>
           <a:p>
-            <a:endParaRPr lang="en-US"/>
-          </a:p>
-        </p:txBody>
-      </p:sp>
-      <p:sp>
-        <p:nvSpPr>
-          <p:cNvPr id="3" name="Picture Placeholder 2" descr="An empty placeholder to add an image. Click on the placeholder and select the image that you wish to add"/>
-          <p:cNvSpPr>
-            <a:spLocks noGrp="1"/>
-          </p:cNvSpPr>
-          <p:nvPr>
-            <p:ph type="pic" idx="1"/>
-          </p:nvPr>
-        </p:nvSpPr>
-        <p:spPr/>
+            <a:r>
+              <a:rPr lang="en-US" dirty="0"/>
+              <a:t>[1] </a:t>
+            </a:r>
+            <a:r>
+              <a:rPr lang="en-US" dirty="0" smtClean="0">
+                <a:hlinkClick r:id="rId2"/>
+              </a:rPr>
+              <a:t>https</a:t>
+            </a:r>
+            <a:r>
+              <a:rPr lang="en-US" dirty="0">
+                <a:hlinkClick r:id="rId2"/>
+              </a:rPr>
+              <a:t>://</a:t>
+            </a:r>
+            <a:r>
+              <a:rPr lang="en-US" dirty="0" smtClean="0">
+                <a:hlinkClick r:id="rId2"/>
+              </a:rPr>
+              <a:t>en.wikipedia.org/wiki/Knight%27s_tour</a:t>
+            </a:r>
+            <a:r>
+              <a:rPr lang="en-US" dirty="0" smtClean="0"/>
+              <a:t> </a:t>
+            </a:r>
+          </a:p>
+          <a:p>
+            <a:r>
+              <a:rPr lang="en-US" dirty="0" smtClean="0"/>
+              <a:t>[</a:t>
+            </a:r>
+            <a:r>
+              <a:rPr lang="en-US" dirty="0"/>
+              <a:t>2] </a:t>
+            </a:r>
+            <a:r>
+              <a:rPr lang="en-US" dirty="0">
+                <a:hlinkClick r:id="rId3"/>
+              </a:rPr>
+              <a:t>https://</a:t>
+            </a:r>
+            <a:r>
+              <a:rPr lang="en-US" dirty="0" smtClean="0">
+                <a:hlinkClick r:id="rId3"/>
+              </a:rPr>
+              <a:t>cosmosmagazine.com/mathematics/knight-s-tour-still-going-strong</a:t>
+            </a:r>
+            <a:r>
+              <a:rPr lang="en-US" dirty="0" smtClean="0"/>
+              <a:t> </a:t>
+            </a:r>
+          </a:p>
+          <a:p>
+            <a:r>
+              <a:rPr lang="en-US" dirty="0" smtClean="0"/>
+              <a:t>[</a:t>
+            </a:r>
+            <a:r>
+              <a:rPr lang="en-US" dirty="0"/>
+              <a:t>3] </a:t>
+            </a:r>
+            <a:r>
+              <a:rPr lang="en-US" dirty="0">
+                <a:hlinkClick r:id="rId4"/>
+              </a:rPr>
+              <a:t>http://</a:t>
+            </a:r>
+            <a:r>
+              <a:rPr lang="en-US" dirty="0" smtClean="0">
+                <a:hlinkClick r:id="rId4"/>
+              </a:rPr>
+              <a:t>www.josiahland.com/archives/781</a:t>
+            </a:r>
+            <a:r>
+              <a:rPr lang="en-US" dirty="0" smtClean="0"/>
+              <a:t> </a:t>
+            </a:r>
+            <a:endParaRPr lang="en-US" dirty="0"/>
+          </a:p>
+        </p:txBody>
       </p:sp>
     </p:spTree>
     <p:extLst>
       <p:ext uri="{BB962C8B-B14F-4D97-AF65-F5344CB8AC3E}">
-        <p14:creationId xmlns:p14="http://schemas.microsoft.com/office/powerpoint/2010/main" val="3734198996"/>
+        <p14:creationId xmlns:p14="http://schemas.microsoft.com/office/powerpoint/2010/main" val="3303454134"/>
       </p:ext>
     </p:extLst>
   </p:cSld>
@@ -9049,9 +8874,10 @@
           <a:lstStyle/>
           <a:p>
             <a:r>
-              <a:rPr lang="en-US" dirty="0"/>
-              <a:t>Add a Slide Title - 5</a:t>
-            </a:r>
+              <a:rPr lang="en-US" dirty="0" smtClean="0"/>
+              <a:t>Empty slide</a:t>
+            </a:r>
+            <a:endParaRPr lang="en-US" dirty="0"/>
           </a:p>
         </p:txBody>
       </p:sp>
@@ -9089,7 +8915,7 @@
     </p:spTree>
     <p:extLst>
       <p:ext uri="{BB962C8B-B14F-4D97-AF65-F5344CB8AC3E}">
-        <p14:creationId xmlns:p14="http://schemas.microsoft.com/office/powerpoint/2010/main" val="3303454134"/>
+        <p14:creationId xmlns:p14="http://schemas.microsoft.com/office/powerpoint/2010/main" val="219409804"/>
       </p:ext>
     </p:extLst>
   </p:cSld>

</xml_diff>